<commit_message>
minor update in sankey sigproc pipeline fig
</commit_message>
<xml_diff>
--- a/alex/figs/_final/figs.pptx
+++ b/alex/figs/_final/figs.pptx
@@ -4367,7 +4367,7 @@
   <pc:docChgLst>
     <pc:chgData name="Alexander von Lühmann" userId="4ffc4e2d339b4992" providerId="LiveId" clId="{53C28701-BEF2-4B44-9EBB-A7EB9BEAA1E2}"/>
     <pc:docChg chg="undo redo custSel addSld delSld modSld sldOrd">
-      <pc:chgData name="Alexander von Lühmann" userId="4ffc4e2d339b4992" providerId="LiveId" clId="{53C28701-BEF2-4B44-9EBB-A7EB9BEAA1E2}" dt="2024-03-07T09:56:48.661" v="4393" actId="1038"/>
+      <pc:chgData name="Alexander von Lühmann" userId="4ffc4e2d339b4992" providerId="LiveId" clId="{53C28701-BEF2-4B44-9EBB-A7EB9BEAA1E2}" dt="2024-03-08T10:31:08.251" v="4395" actId="20577"/>
       <pc:docMkLst>
         <pc:docMk/>
       </pc:docMkLst>
@@ -4440,7 +4440,7 @@
         </pc:sldMkLst>
       </pc:sldChg>
       <pc:sldChg chg="addSp delSp modSp add mod">
-        <pc:chgData name="Alexander von Lühmann" userId="4ffc4e2d339b4992" providerId="LiveId" clId="{53C28701-BEF2-4B44-9EBB-A7EB9BEAA1E2}" dt="2024-03-07T09:56:48.661" v="4393" actId="1038"/>
+        <pc:chgData name="Alexander von Lühmann" userId="4ffc4e2d339b4992" providerId="LiveId" clId="{53C28701-BEF2-4B44-9EBB-A7EB9BEAA1E2}" dt="2024-03-08T10:31:08.251" v="4395" actId="20577"/>
         <pc:sldMkLst>
           <pc:docMk/>
           <pc:sldMk cId="4282935522" sldId="259"/>
@@ -4830,7 +4830,7 @@
           </ac:spMkLst>
         </pc:spChg>
         <pc:spChg chg="mod">
-          <ac:chgData name="Alexander von Lühmann" userId="4ffc4e2d339b4992" providerId="LiveId" clId="{53C28701-BEF2-4B44-9EBB-A7EB9BEAA1E2}" dt="2024-02-28T16:23:34.830" v="626" actId="1036"/>
+          <ac:chgData name="Alexander von Lühmann" userId="4ffc4e2d339b4992" providerId="LiveId" clId="{53C28701-BEF2-4B44-9EBB-A7EB9BEAA1E2}" dt="2024-03-08T10:31:08.251" v="4395" actId="20577"/>
           <ac:spMkLst>
             <pc:docMk/>
             <pc:sldMk cId="4282935522" sldId="259"/>
@@ -8473,7 +8473,7 @@
           <a:p>
             <a:fld id="{DF0C278D-5913-4C77-BD7B-900D67D0FD7D}" type="datetimeFigureOut">
               <a:rPr lang="de-DE" smtClean="0"/>
-              <a:t>07.03.2024</a:t>
+              <a:t>08.03.2024</a:t>
             </a:fld>
             <a:endParaRPr lang="de-DE"/>
           </a:p>
@@ -9064,7 +9064,7 @@
           <a:p>
             <a:fld id="{9DD75875-2B1D-47EB-BBAD-BDAD7646A0A4}" type="datetimeFigureOut">
               <a:rPr lang="de-DE" smtClean="0"/>
-              <a:t>07.03.2024</a:t>
+              <a:t>08.03.2024</a:t>
             </a:fld>
             <a:endParaRPr lang="de-DE"/>
           </a:p>
@@ -9234,7 +9234,7 @@
           <a:p>
             <a:fld id="{9DD75875-2B1D-47EB-BBAD-BDAD7646A0A4}" type="datetimeFigureOut">
               <a:rPr lang="de-DE" smtClean="0"/>
-              <a:t>07.03.2024</a:t>
+              <a:t>08.03.2024</a:t>
             </a:fld>
             <a:endParaRPr lang="de-DE"/>
           </a:p>
@@ -9414,7 +9414,7 @@
           <a:p>
             <a:fld id="{9DD75875-2B1D-47EB-BBAD-BDAD7646A0A4}" type="datetimeFigureOut">
               <a:rPr lang="de-DE" smtClean="0"/>
-              <a:t>07.03.2024</a:t>
+              <a:t>08.03.2024</a:t>
             </a:fld>
             <a:endParaRPr lang="de-DE"/>
           </a:p>
@@ -9584,7 +9584,7 @@
           <a:p>
             <a:fld id="{9DD75875-2B1D-47EB-BBAD-BDAD7646A0A4}" type="datetimeFigureOut">
               <a:rPr lang="de-DE" smtClean="0"/>
-              <a:t>07.03.2024</a:t>
+              <a:t>08.03.2024</a:t>
             </a:fld>
             <a:endParaRPr lang="de-DE"/>
           </a:p>
@@ -9830,7 +9830,7 @@
           <a:p>
             <a:fld id="{9DD75875-2B1D-47EB-BBAD-BDAD7646A0A4}" type="datetimeFigureOut">
               <a:rPr lang="de-DE" smtClean="0"/>
-              <a:t>07.03.2024</a:t>
+              <a:t>08.03.2024</a:t>
             </a:fld>
             <a:endParaRPr lang="de-DE"/>
           </a:p>
@@ -10062,7 +10062,7 @@
           <a:p>
             <a:fld id="{9DD75875-2B1D-47EB-BBAD-BDAD7646A0A4}" type="datetimeFigureOut">
               <a:rPr lang="de-DE" smtClean="0"/>
-              <a:t>07.03.2024</a:t>
+              <a:t>08.03.2024</a:t>
             </a:fld>
             <a:endParaRPr lang="de-DE"/>
           </a:p>
@@ -10429,7 +10429,7 @@
           <a:p>
             <a:fld id="{9DD75875-2B1D-47EB-BBAD-BDAD7646A0A4}" type="datetimeFigureOut">
               <a:rPr lang="de-DE" smtClean="0"/>
-              <a:t>07.03.2024</a:t>
+              <a:t>08.03.2024</a:t>
             </a:fld>
             <a:endParaRPr lang="de-DE"/>
           </a:p>
@@ -10547,7 +10547,7 @@
           <a:p>
             <a:fld id="{9DD75875-2B1D-47EB-BBAD-BDAD7646A0A4}" type="datetimeFigureOut">
               <a:rPr lang="de-DE" smtClean="0"/>
-              <a:t>07.03.2024</a:t>
+              <a:t>08.03.2024</a:t>
             </a:fld>
             <a:endParaRPr lang="de-DE"/>
           </a:p>
@@ -10642,7 +10642,7 @@
           <a:p>
             <a:fld id="{9DD75875-2B1D-47EB-BBAD-BDAD7646A0A4}" type="datetimeFigureOut">
               <a:rPr lang="de-DE" smtClean="0"/>
-              <a:t>07.03.2024</a:t>
+              <a:t>08.03.2024</a:t>
             </a:fld>
             <a:endParaRPr lang="de-DE"/>
           </a:p>
@@ -10919,7 +10919,7 @@
           <a:p>
             <a:fld id="{9DD75875-2B1D-47EB-BBAD-BDAD7646A0A4}" type="datetimeFigureOut">
               <a:rPr lang="de-DE" smtClean="0"/>
-              <a:t>07.03.2024</a:t>
+              <a:t>08.03.2024</a:t>
             </a:fld>
             <a:endParaRPr lang="de-DE"/>
           </a:p>
@@ -11176,7 +11176,7 @@
           <a:p>
             <a:fld id="{9DD75875-2B1D-47EB-BBAD-BDAD7646A0A4}" type="datetimeFigureOut">
               <a:rPr lang="de-DE" smtClean="0"/>
-              <a:t>07.03.2024</a:t>
+              <a:t>08.03.2024</a:t>
             </a:fld>
             <a:endParaRPr lang="de-DE"/>
           </a:p>
@@ -11389,7 +11389,7 @@
           <a:p>
             <a:fld id="{9DD75875-2B1D-47EB-BBAD-BDAD7646A0A4}" type="datetimeFigureOut">
               <a:rPr lang="de-DE" smtClean="0"/>
-              <a:t>07.03.2024</a:t>
+              <a:t>08.03.2024</a:t>
             </a:fld>
             <a:endParaRPr lang="de-DE"/>
           </a:p>
@@ -16449,7 +16449,7 @@
                     </a:schemeClr>
                   </a:solidFill>
                 </a:rPr>
-                <a:t>Motion Artefacts</a:t>
+                <a:t>Motion Artifacts</a:t>
               </a:r>
             </a:p>
           </p:txBody>

</xml_diff>

<commit_message>
Updated Sankey plots in Section 2 according to author comments
</commit_message>
<xml_diff>
--- a/alex/figs/_final/figs.pptx
+++ b/alex/figs/_final/figs.pptx
@@ -123,13 +123,388 @@
 <file path=ppt/revisionInfo.xml><?xml version="1.0" encoding="utf-8"?>
 <p1510:revInfo xmlns:a="http://schemas.openxmlformats.org/drawingml/2006/main" xmlns:r="http://schemas.openxmlformats.org/officeDocument/2006/relationships" xmlns:p1510="http://schemas.microsoft.com/office/powerpoint/2015/10/main">
   <p1510:revLst>
-    <p1510:client id="{53C28701-BEF2-4B44-9EBB-A7EB9BEAA1E2}" v="165" dt="2024-03-07T09:56:42.136"/>
+    <p1510:client id="{3BC9F152-53BB-479D-A1F7-AF091793EADB}" v="7" dt="2024-05-06T14:16:36.084"/>
   </p1510:revLst>
 </p1510:revInfo>
 </file>
 
 <file path=ppt/changesInfos/changesInfo1.xml><?xml version="1.0" encoding="utf-8"?>
 <pc:chgInfo xmlns:a="http://schemas.openxmlformats.org/drawingml/2006/main" xmlns:r="http://schemas.openxmlformats.org/officeDocument/2006/relationships" xmlns:ac="http://schemas.microsoft.com/office/drawing/2013/main/command" xmlns:pc="http://schemas.microsoft.com/office/powerpoint/2013/main/command">
+  <pc:docChgLst>
+    <pc:chgData name="Alexander von Lühmann" userId="4ffc4e2d339b4992" providerId="LiveId" clId="{3BC9F152-53BB-479D-A1F7-AF091793EADB}"/>
+    <pc:docChg chg="undo custSel modSld">
+      <pc:chgData name="Alexander von Lühmann" userId="4ffc4e2d339b4992" providerId="LiveId" clId="{3BC9F152-53BB-479D-A1F7-AF091793EADB}" dt="2024-05-06T14:23:57.285" v="574" actId="1035"/>
+      <pc:docMkLst>
+        <pc:docMk/>
+      </pc:docMkLst>
+      <pc:sldChg chg="addSp delSp modSp mod">
+        <pc:chgData name="Alexander von Lühmann" userId="4ffc4e2d339b4992" providerId="LiveId" clId="{3BC9F152-53BB-479D-A1F7-AF091793EADB}" dt="2024-05-06T14:18:04.607" v="533" actId="1038"/>
+        <pc:sldMkLst>
+          <pc:docMk/>
+          <pc:sldMk cId="4282935522" sldId="259"/>
+        </pc:sldMkLst>
+        <pc:spChg chg="del mod ord">
+          <ac:chgData name="Alexander von Lühmann" userId="4ffc4e2d339b4992" providerId="LiveId" clId="{3BC9F152-53BB-479D-A1F7-AF091793EADB}" dt="2024-05-06T13:56:30.932" v="307" actId="478"/>
+          <ac:spMkLst>
+            <pc:docMk/>
+            <pc:sldMk cId="4282935522" sldId="259"/>
+            <ac:spMk id="5" creationId="{38E6293C-E133-AC81-8CC3-D05681C72B57}"/>
+          </ac:spMkLst>
+        </pc:spChg>
+        <pc:spChg chg="mod">
+          <ac:chgData name="Alexander von Lühmann" userId="4ffc4e2d339b4992" providerId="LiveId" clId="{3BC9F152-53BB-479D-A1F7-AF091793EADB}" dt="2024-05-06T13:46:28.734" v="148" actId="1076"/>
+          <ac:spMkLst>
+            <pc:docMk/>
+            <pc:sldMk cId="4282935522" sldId="259"/>
+            <ac:spMk id="6" creationId="{6A249053-41E9-504E-A52A-61A1995E9131}"/>
+          </ac:spMkLst>
+        </pc:spChg>
+        <pc:spChg chg="mod">
+          <ac:chgData name="Alexander von Lühmann" userId="4ffc4e2d339b4992" providerId="LiveId" clId="{3BC9F152-53BB-479D-A1F7-AF091793EADB}" dt="2024-05-06T13:46:47.877" v="164" actId="1076"/>
+          <ac:spMkLst>
+            <pc:docMk/>
+            <pc:sldMk cId="4282935522" sldId="259"/>
+            <ac:spMk id="18" creationId="{6CC1405D-EBAF-0B71-6D1C-D976EC4C6E27}"/>
+          </ac:spMkLst>
+        </pc:spChg>
+        <pc:spChg chg="mod">
+          <ac:chgData name="Alexander von Lühmann" userId="4ffc4e2d339b4992" providerId="LiveId" clId="{3BC9F152-53BB-479D-A1F7-AF091793EADB}" dt="2024-05-06T13:46:43.333" v="163" actId="1076"/>
+          <ac:spMkLst>
+            <pc:docMk/>
+            <pc:sldMk cId="4282935522" sldId="259"/>
+            <ac:spMk id="19" creationId="{11B5C7E3-F36C-5DCF-F9AF-814F1445341E}"/>
+          </ac:spMkLst>
+        </pc:spChg>
+        <pc:spChg chg="del">
+          <ac:chgData name="Alexander von Lühmann" userId="4ffc4e2d339b4992" providerId="LiveId" clId="{3BC9F152-53BB-479D-A1F7-AF091793EADB}" dt="2024-05-06T13:42:40.781" v="67" actId="478"/>
+          <ac:spMkLst>
+            <pc:docMk/>
+            <pc:sldMk cId="4282935522" sldId="259"/>
+            <ac:spMk id="39" creationId="{A32BFE31-E579-1D8A-1A0A-0F4142D45147}"/>
+          </ac:spMkLst>
+        </pc:spChg>
+        <pc:spChg chg="mod">
+          <ac:chgData name="Alexander von Lühmann" userId="4ffc4e2d339b4992" providerId="LiveId" clId="{3BC9F152-53BB-479D-A1F7-AF091793EADB}" dt="2024-05-06T13:46:51.549" v="165" actId="1076"/>
+          <ac:spMkLst>
+            <pc:docMk/>
+            <pc:sldMk cId="4282935522" sldId="259"/>
+            <ac:spMk id="40" creationId="{7F315EE5-E02B-C2FD-0DC0-309A1F8DF248}"/>
+          </ac:spMkLst>
+        </pc:spChg>
+        <pc:spChg chg="mod">
+          <ac:chgData name="Alexander von Lühmann" userId="4ffc4e2d339b4992" providerId="LiveId" clId="{3BC9F152-53BB-479D-A1F7-AF091793EADB}" dt="2024-05-06T13:46:54.525" v="166" actId="1076"/>
+          <ac:spMkLst>
+            <pc:docMk/>
+            <pc:sldMk cId="4282935522" sldId="259"/>
+            <ac:spMk id="41" creationId="{BD773782-CE67-8CE3-99F3-4B813D46D9D3}"/>
+          </ac:spMkLst>
+        </pc:spChg>
+        <pc:spChg chg="mod">
+          <ac:chgData name="Alexander von Lühmann" userId="4ffc4e2d339b4992" providerId="LiveId" clId="{3BC9F152-53BB-479D-A1F7-AF091793EADB}" dt="2024-05-06T13:46:57.549" v="167" actId="1076"/>
+          <ac:spMkLst>
+            <pc:docMk/>
+            <pc:sldMk cId="4282935522" sldId="259"/>
+            <ac:spMk id="56" creationId="{2871F6EE-7F5A-6148-5CF7-B8C524960739}"/>
+          </ac:spMkLst>
+        </pc:spChg>
+        <pc:spChg chg="mod">
+          <ac:chgData name="Alexander von Lühmann" userId="4ffc4e2d339b4992" providerId="LiveId" clId="{3BC9F152-53BB-479D-A1F7-AF091793EADB}" dt="2024-05-06T13:47:10.397" v="169" actId="1076"/>
+          <ac:spMkLst>
+            <pc:docMk/>
+            <pc:sldMk cId="4282935522" sldId="259"/>
+            <ac:spMk id="57" creationId="{A4A94965-27FF-DF2D-08A5-914B09A185DC}"/>
+          </ac:spMkLst>
+        </pc:spChg>
+        <pc:spChg chg="mod">
+          <ac:chgData name="Alexander von Lühmann" userId="4ffc4e2d339b4992" providerId="LiveId" clId="{3BC9F152-53BB-479D-A1F7-AF091793EADB}" dt="2024-05-06T13:47:02.974" v="168" actId="1076"/>
+          <ac:spMkLst>
+            <pc:docMk/>
+            <pc:sldMk cId="4282935522" sldId="259"/>
+            <ac:spMk id="65" creationId="{EE893595-5901-F433-1625-C9830E083E48}"/>
+          </ac:spMkLst>
+        </pc:spChg>
+        <pc:spChg chg="mod">
+          <ac:chgData name="Alexander von Lühmann" userId="4ffc4e2d339b4992" providerId="LiveId" clId="{3BC9F152-53BB-479D-A1F7-AF091793EADB}" dt="2024-05-06T13:47:20.053" v="171" actId="1076"/>
+          <ac:spMkLst>
+            <pc:docMk/>
+            <pc:sldMk cId="4282935522" sldId="259"/>
+            <ac:spMk id="69" creationId="{17ADBA87-D364-2288-C1EE-B5CF0E836332}"/>
+          </ac:spMkLst>
+        </pc:spChg>
+        <pc:spChg chg="mod">
+          <ac:chgData name="Alexander von Lühmann" userId="4ffc4e2d339b4992" providerId="LiveId" clId="{3BC9F152-53BB-479D-A1F7-AF091793EADB}" dt="2024-05-06T13:47:31.716" v="172" actId="1076"/>
+          <ac:spMkLst>
+            <pc:docMk/>
+            <pc:sldMk cId="4282935522" sldId="259"/>
+            <ac:spMk id="70" creationId="{B3E99D51-CEDB-94C7-466F-78F1FBB3BF47}"/>
+          </ac:spMkLst>
+        </pc:spChg>
+        <pc:spChg chg="del mod ord">
+          <ac:chgData name="Alexander von Lühmann" userId="4ffc4e2d339b4992" providerId="LiveId" clId="{3BC9F152-53BB-479D-A1F7-AF091793EADB}" dt="2024-05-06T13:56:52.708" v="348" actId="478"/>
+          <ac:spMkLst>
+            <pc:docMk/>
+            <pc:sldMk cId="4282935522" sldId="259"/>
+            <ac:spMk id="96" creationId="{9EA1F853-98C3-8221-1AA7-E0FAA020B075}"/>
+          </ac:spMkLst>
+        </pc:spChg>
+        <pc:spChg chg="mod">
+          <ac:chgData name="Alexander von Lühmann" userId="4ffc4e2d339b4992" providerId="LiveId" clId="{3BC9F152-53BB-479D-A1F7-AF091793EADB}" dt="2024-05-06T13:42:47.173" v="69" actId="20577"/>
+          <ac:spMkLst>
+            <pc:docMk/>
+            <pc:sldMk cId="4282935522" sldId="259"/>
+            <ac:spMk id="147" creationId="{9440D520-25CA-183A-69AE-9BE17CFB0214}"/>
+          </ac:spMkLst>
+        </pc:spChg>
+        <pc:spChg chg="mod ord">
+          <ac:chgData name="Alexander von Lühmann" userId="4ffc4e2d339b4992" providerId="LiveId" clId="{3BC9F152-53BB-479D-A1F7-AF091793EADB}" dt="2024-05-06T13:50:29.060" v="265" actId="1076"/>
+          <ac:spMkLst>
+            <pc:docMk/>
+            <pc:sldMk cId="4282935522" sldId="259"/>
+            <ac:spMk id="155" creationId="{63C8BD21-C31E-CDA5-44CE-E0289367F2B0}"/>
+          </ac:spMkLst>
+        </pc:spChg>
+        <pc:spChg chg="add del mod">
+          <ac:chgData name="Alexander von Lühmann" userId="4ffc4e2d339b4992" providerId="LiveId" clId="{3BC9F152-53BB-479D-A1F7-AF091793EADB}" dt="2024-05-06T13:47:55.464" v="177" actId="21"/>
+          <ac:spMkLst>
+            <pc:docMk/>
+            <pc:sldMk cId="4282935522" sldId="259"/>
+            <ac:spMk id="156" creationId="{CD9E5C90-3B46-228B-04CD-221CD73ADD7B}"/>
+          </ac:spMkLst>
+        </pc:spChg>
+        <pc:spChg chg="add del mod">
+          <ac:chgData name="Alexander von Lühmann" userId="4ffc4e2d339b4992" providerId="LiveId" clId="{3BC9F152-53BB-479D-A1F7-AF091793EADB}" dt="2024-05-06T13:50:00.613" v="264" actId="478"/>
+          <ac:spMkLst>
+            <pc:docMk/>
+            <pc:sldMk cId="4282935522" sldId="259"/>
+            <ac:spMk id="157" creationId="{CD9E5C90-3B46-228B-04CD-221CD73ADD7B}"/>
+          </ac:spMkLst>
+        </pc:spChg>
+        <pc:spChg chg="add mod">
+          <ac:chgData name="Alexander von Lühmann" userId="4ffc4e2d339b4992" providerId="LiveId" clId="{3BC9F152-53BB-479D-A1F7-AF091793EADB}" dt="2024-05-06T14:18:04.607" v="533" actId="1038"/>
+          <ac:spMkLst>
+            <pc:docMk/>
+            <pc:sldMk cId="4282935522" sldId="259"/>
+            <ac:spMk id="158" creationId="{D6DEC4F2-CC94-8149-AB0B-88EC00108FCD}"/>
+          </ac:spMkLst>
+        </pc:spChg>
+        <pc:spChg chg="mod">
+          <ac:chgData name="Alexander von Lühmann" userId="4ffc4e2d339b4992" providerId="LiveId" clId="{3BC9F152-53BB-479D-A1F7-AF091793EADB}" dt="2024-05-06T13:46:33.013" v="149" actId="1076"/>
+          <ac:spMkLst>
+            <pc:docMk/>
+            <pc:sldMk cId="4282935522" sldId="259"/>
+            <ac:spMk id="160" creationId="{B72F0A8D-E395-7104-0051-3366422F1A86}"/>
+          </ac:spMkLst>
+        </pc:spChg>
+        <pc:spChg chg="mod">
+          <ac:chgData name="Alexander von Lühmann" userId="4ffc4e2d339b4992" providerId="LiveId" clId="{3BC9F152-53BB-479D-A1F7-AF091793EADB}" dt="2024-05-06T13:46:39.954" v="162" actId="1038"/>
+          <ac:spMkLst>
+            <pc:docMk/>
+            <pc:sldMk cId="4282935522" sldId="259"/>
+            <ac:spMk id="161" creationId="{159AFED0-3591-C2CF-0E74-C4B6840CD49C}"/>
+          </ac:spMkLst>
+        </pc:spChg>
+        <pc:spChg chg="add mod">
+          <ac:chgData name="Alexander von Lühmann" userId="4ffc4e2d339b4992" providerId="LiveId" clId="{3BC9F152-53BB-479D-A1F7-AF091793EADB}" dt="2024-05-06T13:56:58.621" v="349" actId="1076"/>
+          <ac:spMkLst>
+            <pc:docMk/>
+            <pc:sldMk cId="4282935522" sldId="259"/>
+            <ac:spMk id="169" creationId="{684BB657-3C07-DC5E-ADFC-4ACDF5415111}"/>
+          </ac:spMkLst>
+        </pc:spChg>
+        <pc:picChg chg="del">
+          <ac:chgData name="Alexander von Lühmann" userId="4ffc4e2d339b4992" providerId="LiveId" clId="{3BC9F152-53BB-479D-A1F7-AF091793EADB}" dt="2024-05-06T13:39:36.509" v="6" actId="478"/>
+          <ac:picMkLst>
+            <pc:docMk/>
+            <pc:sldMk cId="4282935522" sldId="259"/>
+            <ac:picMk id="12" creationId="{78717855-F967-D4D3-6C6B-21F53D9BE4F3}"/>
+          </ac:picMkLst>
+        </pc:picChg>
+        <pc:picChg chg="add mod ord">
+          <ac:chgData name="Alexander von Lühmann" userId="4ffc4e2d339b4992" providerId="LiveId" clId="{3BC9F152-53BB-479D-A1F7-AF091793EADB}" dt="2024-05-06T13:40:21.110" v="17" actId="688"/>
+          <ac:picMkLst>
+            <pc:docMk/>
+            <pc:sldMk cId="4282935522" sldId="259"/>
+            <ac:picMk id="107" creationId="{B9554B4E-82F3-1A4B-F18B-DB1CEFC411CA}"/>
+          </ac:picMkLst>
+        </pc:picChg>
+        <pc:picChg chg="ord">
+          <ac:chgData name="Alexander von Lühmann" userId="4ffc4e2d339b4992" providerId="LiveId" clId="{3BC9F152-53BB-479D-A1F7-AF091793EADB}" dt="2024-05-06T13:39:45.461" v="10" actId="167"/>
+          <ac:picMkLst>
+            <pc:docMk/>
+            <pc:sldMk cId="4282935522" sldId="259"/>
+            <ac:picMk id="120" creationId="{0614BBE9-90F4-E040-3003-CA63D3C0E24F}"/>
+          </ac:picMkLst>
+        </pc:picChg>
+        <pc:cxnChg chg="add mod">
+          <ac:chgData name="Alexander von Lühmann" userId="4ffc4e2d339b4992" providerId="LiveId" clId="{3BC9F152-53BB-479D-A1F7-AF091793EADB}" dt="2024-05-06T13:43:54.470" v="125" actId="1038"/>
+          <ac:cxnSpMkLst>
+            <pc:docMk/>
+            <pc:sldMk cId="4282935522" sldId="259"/>
+            <ac:cxnSpMk id="114" creationId="{A9527715-D8E1-AEEA-BFED-150FD19CC545}"/>
+          </ac:cxnSpMkLst>
+        </pc:cxnChg>
+        <pc:cxnChg chg="mod">
+          <ac:chgData name="Alexander von Lühmann" userId="4ffc4e2d339b4992" providerId="LiveId" clId="{3BC9F152-53BB-479D-A1F7-AF091793EADB}" dt="2024-05-06T13:42:28.894" v="65" actId="14100"/>
+          <ac:cxnSpMkLst>
+            <pc:docMk/>
+            <pc:sldMk cId="4282935522" sldId="259"/>
+            <ac:cxnSpMk id="200" creationId="{173DA857-1EA3-92FD-FAAD-F6270EF2E170}"/>
+          </ac:cxnSpMkLst>
+        </pc:cxnChg>
+        <pc:cxnChg chg="mod">
+          <ac:chgData name="Alexander von Lühmann" userId="4ffc4e2d339b4992" providerId="LiveId" clId="{3BC9F152-53BB-479D-A1F7-AF091793EADB}" dt="2024-05-06T13:44:22.268" v="129" actId="14100"/>
+          <ac:cxnSpMkLst>
+            <pc:docMk/>
+            <pc:sldMk cId="4282935522" sldId="259"/>
+            <ac:cxnSpMk id="203" creationId="{3D4F3B9B-811B-6C83-DFB9-892935601999}"/>
+          </ac:cxnSpMkLst>
+        </pc:cxnChg>
+        <pc:cxnChg chg="del mod">
+          <ac:chgData name="Alexander von Lühmann" userId="4ffc4e2d339b4992" providerId="LiveId" clId="{3BC9F152-53BB-479D-A1F7-AF091793EADB}" dt="2024-05-06T13:43:40.357" v="111" actId="478"/>
+          <ac:cxnSpMkLst>
+            <pc:docMk/>
+            <pc:sldMk cId="4282935522" sldId="259"/>
+            <ac:cxnSpMk id="209" creationId="{F6AFF022-C199-AE9C-6E8D-763554201520}"/>
+          </ac:cxnSpMkLst>
+        </pc:cxnChg>
+        <pc:cxnChg chg="del">
+          <ac:chgData name="Alexander von Lühmann" userId="4ffc4e2d339b4992" providerId="LiveId" clId="{3BC9F152-53BB-479D-A1F7-AF091793EADB}" dt="2024-05-06T13:42:19.276" v="63" actId="478"/>
+          <ac:cxnSpMkLst>
+            <pc:docMk/>
+            <pc:sldMk cId="4282935522" sldId="259"/>
+            <ac:cxnSpMk id="211" creationId="{4734A628-5356-3809-8B66-728534C71ED2}"/>
+          </ac:cxnSpMkLst>
+        </pc:cxnChg>
+        <pc:cxnChg chg="mod">
+          <ac:chgData name="Alexander von Lühmann" userId="4ffc4e2d339b4992" providerId="LiveId" clId="{3BC9F152-53BB-479D-A1F7-AF091793EADB}" dt="2024-05-06T13:44:25.373" v="130" actId="14100"/>
+          <ac:cxnSpMkLst>
+            <pc:docMk/>
+            <pc:sldMk cId="4282935522" sldId="259"/>
+            <ac:cxnSpMk id="226" creationId="{E763BB71-E9F8-40E5-A867-C408ADEEA9C8}"/>
+          </ac:cxnSpMkLst>
+        </pc:cxnChg>
+      </pc:sldChg>
+      <pc:sldChg chg="addSp delSp modSp mod">
+        <pc:chgData name="Alexander von Lühmann" userId="4ffc4e2d339b4992" providerId="LiveId" clId="{3BC9F152-53BB-479D-A1F7-AF091793EADB}" dt="2024-05-06T14:23:57.285" v="574" actId="1035"/>
+        <pc:sldMkLst>
+          <pc:docMk/>
+          <pc:sldMk cId="3313870647" sldId="260"/>
+        </pc:sldMkLst>
+        <pc:spChg chg="mod">
+          <ac:chgData name="Alexander von Lühmann" userId="4ffc4e2d339b4992" providerId="LiveId" clId="{3BC9F152-53BB-479D-A1F7-AF091793EADB}" dt="2024-05-06T14:15:23.204" v="470" actId="1076"/>
+          <ac:spMkLst>
+            <pc:docMk/>
+            <pc:sldMk cId="3313870647" sldId="260"/>
+            <ac:spMk id="8" creationId="{4B542639-52F1-736C-0954-272B318FAB2A}"/>
+          </ac:spMkLst>
+        </pc:spChg>
+        <pc:spChg chg="mod">
+          <ac:chgData name="Alexander von Lühmann" userId="4ffc4e2d339b4992" providerId="LiveId" clId="{3BC9F152-53BB-479D-A1F7-AF091793EADB}" dt="2024-05-06T14:23:57.285" v="574" actId="1035"/>
+          <ac:spMkLst>
+            <pc:docMk/>
+            <pc:sldMk cId="3313870647" sldId="260"/>
+            <ac:spMk id="25" creationId="{74F3BE48-33A6-0AB8-B12E-EE78D949896D}"/>
+          </ac:spMkLst>
+        </pc:spChg>
+        <pc:spChg chg="mod">
+          <ac:chgData name="Alexander von Lühmann" userId="4ffc4e2d339b4992" providerId="LiveId" clId="{3BC9F152-53BB-479D-A1F7-AF091793EADB}" dt="2024-05-06T14:10:24.084" v="356" actId="6549"/>
+          <ac:spMkLst>
+            <pc:docMk/>
+            <pc:sldMk cId="3313870647" sldId="260"/>
+            <ac:spMk id="40" creationId="{91105966-61F9-0A6F-A712-49C428C34F4C}"/>
+          </ac:spMkLst>
+        </pc:spChg>
+        <pc:spChg chg="mod">
+          <ac:chgData name="Alexander von Lühmann" userId="4ffc4e2d339b4992" providerId="LiveId" clId="{3BC9F152-53BB-479D-A1F7-AF091793EADB}" dt="2024-05-06T14:14:04.260" v="360" actId="20577"/>
+          <ac:spMkLst>
+            <pc:docMk/>
+            <pc:sldMk cId="3313870647" sldId="260"/>
+            <ac:spMk id="48" creationId="{97F14D53-8A11-268D-B7A0-A934EFB77634}"/>
+          </ac:spMkLst>
+        </pc:spChg>
+        <pc:spChg chg="mod">
+          <ac:chgData name="Alexander von Lühmann" userId="4ffc4e2d339b4992" providerId="LiveId" clId="{3BC9F152-53BB-479D-A1F7-AF091793EADB}" dt="2024-05-06T14:14:44.403" v="395" actId="20577"/>
+          <ac:spMkLst>
+            <pc:docMk/>
+            <pc:sldMk cId="3313870647" sldId="260"/>
+            <ac:spMk id="294" creationId="{DB92716C-B914-91D1-A38F-5C7FD767EB95}"/>
+          </ac:spMkLst>
+        </pc:spChg>
+        <pc:spChg chg="mod">
+          <ac:chgData name="Alexander von Lühmann" userId="4ffc4e2d339b4992" providerId="LiveId" clId="{3BC9F152-53BB-479D-A1F7-AF091793EADB}" dt="2024-05-06T14:17:47.590" v="509" actId="1036"/>
+          <ac:spMkLst>
+            <pc:docMk/>
+            <pc:sldMk cId="3313870647" sldId="260"/>
+            <ac:spMk id="295" creationId="{382AAC5C-E00A-12B6-783E-814999929D9C}"/>
+          </ac:spMkLst>
+        </pc:spChg>
+        <pc:spChg chg="mod">
+          <ac:chgData name="Alexander von Lühmann" userId="4ffc4e2d339b4992" providerId="LiveId" clId="{3BC9F152-53BB-479D-A1F7-AF091793EADB}" dt="2024-05-06T14:17:41.414" v="501" actId="6549"/>
+          <ac:spMkLst>
+            <pc:docMk/>
+            <pc:sldMk cId="3313870647" sldId="260"/>
+            <ac:spMk id="296" creationId="{ADDA7C7C-5D34-C2CF-310F-0E434FB31C5A}"/>
+          </ac:spMkLst>
+        </pc:spChg>
+        <pc:spChg chg="mod">
+          <ac:chgData name="Alexander von Lühmann" userId="4ffc4e2d339b4992" providerId="LiveId" clId="{3BC9F152-53BB-479D-A1F7-AF091793EADB}" dt="2024-05-06T14:15:25.867" v="471" actId="1076"/>
+          <ac:spMkLst>
+            <pc:docMk/>
+            <pc:sldMk cId="3313870647" sldId="260"/>
+            <ac:spMk id="297" creationId="{AF3C600F-97C1-E7AD-0F4F-40CEA0745941}"/>
+          </ac:spMkLst>
+        </pc:spChg>
+        <pc:spChg chg="mod">
+          <ac:chgData name="Alexander von Lühmann" userId="4ffc4e2d339b4992" providerId="LiveId" clId="{3BC9F152-53BB-479D-A1F7-AF091793EADB}" dt="2024-05-06T14:16:26.637" v="496" actId="6549"/>
+          <ac:spMkLst>
+            <pc:docMk/>
+            <pc:sldMk cId="3313870647" sldId="260"/>
+            <ac:spMk id="298" creationId="{02C221F3-41F3-02BA-D95D-E2CD90A4AF41}"/>
+          </ac:spMkLst>
+        </pc:spChg>
+        <pc:spChg chg="mod">
+          <ac:chgData name="Alexander von Lühmann" userId="4ffc4e2d339b4992" providerId="LiveId" clId="{3BC9F152-53BB-479D-A1F7-AF091793EADB}" dt="2024-05-06T14:19:32.147" v="537" actId="20577"/>
+          <ac:spMkLst>
+            <pc:docMk/>
+            <pc:sldMk cId="3313870647" sldId="260"/>
+            <ac:spMk id="350" creationId="{C6ECBE59-FA27-E1D4-6665-714F369A91F5}"/>
+          </ac:spMkLst>
+        </pc:spChg>
+        <pc:picChg chg="mod">
+          <ac:chgData name="Alexander von Lühmann" userId="4ffc4e2d339b4992" providerId="LiveId" clId="{3BC9F152-53BB-479D-A1F7-AF091793EADB}" dt="2024-05-06T14:15:19.749" v="469" actId="1076"/>
+          <ac:picMkLst>
+            <pc:docMk/>
+            <pc:sldMk cId="3313870647" sldId="260"/>
+            <ac:picMk id="220" creationId="{1EA9F2A3-E53E-BBA3-7A1C-44ECFBB79701}"/>
+          </ac:picMkLst>
+        </pc:picChg>
+        <pc:cxnChg chg="add mod">
+          <ac:chgData name="Alexander von Lühmann" userId="4ffc4e2d339b4992" providerId="LiveId" clId="{3BC9F152-53BB-479D-A1F7-AF091793EADB}" dt="2024-05-06T14:15:54.835" v="494" actId="14100"/>
+          <ac:cxnSpMkLst>
+            <pc:docMk/>
+            <pc:sldMk cId="3313870647" sldId="260"/>
+            <ac:cxnSpMk id="2" creationId="{F6851396-68FD-DDCE-C186-16AE5A723018}"/>
+          </ac:cxnSpMkLst>
+        </pc:cxnChg>
+        <pc:cxnChg chg="add mod">
+          <ac:chgData name="Alexander von Lühmann" userId="4ffc4e2d339b4992" providerId="LiveId" clId="{3BC9F152-53BB-479D-A1F7-AF091793EADB}" dt="2024-05-06T14:16:45.851" v="500" actId="14100"/>
+          <ac:cxnSpMkLst>
+            <pc:docMk/>
+            <pc:sldMk cId="3313870647" sldId="260"/>
+            <ac:cxnSpMk id="6" creationId="{D51B270B-DCC2-CFA4-DD55-AD1EB8F9F083}"/>
+          </ac:cxnSpMkLst>
+        </pc:cxnChg>
+        <pc:cxnChg chg="del">
+          <ac:chgData name="Alexander von Lühmann" userId="4ffc4e2d339b4992" providerId="LiveId" clId="{3BC9F152-53BB-479D-A1F7-AF091793EADB}" dt="2024-05-06T14:16:28.138" v="497" actId="478"/>
+          <ac:cxnSpMkLst>
+            <pc:docMk/>
+            <pc:sldMk cId="3313870647" sldId="260"/>
+            <ac:cxnSpMk id="341" creationId="{A445EE3F-3E61-A8FE-5198-CAD4ADAC86EB}"/>
+          </ac:cxnSpMkLst>
+        </pc:cxnChg>
+      </pc:sldChg>
+    </pc:docChg>
+  </pc:docChgLst>
   <pc:docChgLst>
     <pc:chgData name="Alexander von Lühmann" userId="4ffc4e2d339b4992" providerId="LiveId" clId="{7619ECA8-B982-4109-BE04-6E3A8004BC22}"/>
     <pc:docChg chg="undo redo custSel addSld modSld modMainMaster">
@@ -8473,7 +8848,7 @@
           <a:p>
             <a:fld id="{DF0C278D-5913-4C77-BD7B-900D67D0FD7D}" type="datetimeFigureOut">
               <a:rPr lang="de-DE" smtClean="0"/>
-              <a:t>08.03.2024</a:t>
+              <a:t>06.05.2024</a:t>
             </a:fld>
             <a:endParaRPr lang="de-DE"/>
           </a:p>
@@ -9064,7 +9439,7 @@
           <a:p>
             <a:fld id="{9DD75875-2B1D-47EB-BBAD-BDAD7646A0A4}" type="datetimeFigureOut">
               <a:rPr lang="de-DE" smtClean="0"/>
-              <a:t>08.03.2024</a:t>
+              <a:t>06.05.2024</a:t>
             </a:fld>
             <a:endParaRPr lang="de-DE"/>
           </a:p>
@@ -9234,7 +9609,7 @@
           <a:p>
             <a:fld id="{9DD75875-2B1D-47EB-BBAD-BDAD7646A0A4}" type="datetimeFigureOut">
               <a:rPr lang="de-DE" smtClean="0"/>
-              <a:t>08.03.2024</a:t>
+              <a:t>06.05.2024</a:t>
             </a:fld>
             <a:endParaRPr lang="de-DE"/>
           </a:p>
@@ -9414,7 +9789,7 @@
           <a:p>
             <a:fld id="{9DD75875-2B1D-47EB-BBAD-BDAD7646A0A4}" type="datetimeFigureOut">
               <a:rPr lang="de-DE" smtClean="0"/>
-              <a:t>08.03.2024</a:t>
+              <a:t>06.05.2024</a:t>
             </a:fld>
             <a:endParaRPr lang="de-DE"/>
           </a:p>
@@ -9584,7 +9959,7 @@
           <a:p>
             <a:fld id="{9DD75875-2B1D-47EB-BBAD-BDAD7646A0A4}" type="datetimeFigureOut">
               <a:rPr lang="de-DE" smtClean="0"/>
-              <a:t>08.03.2024</a:t>
+              <a:t>06.05.2024</a:t>
             </a:fld>
             <a:endParaRPr lang="de-DE"/>
           </a:p>
@@ -9830,7 +10205,7 @@
           <a:p>
             <a:fld id="{9DD75875-2B1D-47EB-BBAD-BDAD7646A0A4}" type="datetimeFigureOut">
               <a:rPr lang="de-DE" smtClean="0"/>
-              <a:t>08.03.2024</a:t>
+              <a:t>06.05.2024</a:t>
             </a:fld>
             <a:endParaRPr lang="de-DE"/>
           </a:p>
@@ -10062,7 +10437,7 @@
           <a:p>
             <a:fld id="{9DD75875-2B1D-47EB-BBAD-BDAD7646A0A4}" type="datetimeFigureOut">
               <a:rPr lang="de-DE" smtClean="0"/>
-              <a:t>08.03.2024</a:t>
+              <a:t>06.05.2024</a:t>
             </a:fld>
             <a:endParaRPr lang="de-DE"/>
           </a:p>
@@ -10429,7 +10804,7 @@
           <a:p>
             <a:fld id="{9DD75875-2B1D-47EB-BBAD-BDAD7646A0A4}" type="datetimeFigureOut">
               <a:rPr lang="de-DE" smtClean="0"/>
-              <a:t>08.03.2024</a:t>
+              <a:t>06.05.2024</a:t>
             </a:fld>
             <a:endParaRPr lang="de-DE"/>
           </a:p>
@@ -10547,7 +10922,7 @@
           <a:p>
             <a:fld id="{9DD75875-2B1D-47EB-BBAD-BDAD7646A0A4}" type="datetimeFigureOut">
               <a:rPr lang="de-DE" smtClean="0"/>
-              <a:t>08.03.2024</a:t>
+              <a:t>06.05.2024</a:t>
             </a:fld>
             <a:endParaRPr lang="de-DE"/>
           </a:p>
@@ -10642,7 +11017,7 @@
           <a:p>
             <a:fld id="{9DD75875-2B1D-47EB-BBAD-BDAD7646A0A4}" type="datetimeFigureOut">
               <a:rPr lang="de-DE" smtClean="0"/>
-              <a:t>08.03.2024</a:t>
+              <a:t>06.05.2024</a:t>
             </a:fld>
             <a:endParaRPr lang="de-DE"/>
           </a:p>
@@ -10919,7 +11294,7 @@
           <a:p>
             <a:fld id="{9DD75875-2B1D-47EB-BBAD-BDAD7646A0A4}" type="datetimeFigureOut">
               <a:rPr lang="de-DE" smtClean="0"/>
-              <a:t>08.03.2024</a:t>
+              <a:t>06.05.2024</a:t>
             </a:fld>
             <a:endParaRPr lang="de-DE"/>
           </a:p>
@@ -11176,7 +11551,7 @@
           <a:p>
             <a:fld id="{9DD75875-2B1D-47EB-BBAD-BDAD7646A0A4}" type="datetimeFigureOut">
               <a:rPr lang="de-DE" smtClean="0"/>
-              <a:t>08.03.2024</a:t>
+              <a:t>06.05.2024</a:t>
             </a:fld>
             <a:endParaRPr lang="de-DE"/>
           </a:p>
@@ -11389,7 +11764,7 @@
           <a:p>
             <a:fld id="{9DD75875-2B1D-47EB-BBAD-BDAD7646A0A4}" type="datetimeFigureOut">
               <a:rPr lang="de-DE" smtClean="0"/>
-              <a:t>08.03.2024</a:t>
+              <a:t>06.05.2024</a:t>
             </a:fld>
             <a:endParaRPr lang="de-DE"/>
           </a:p>
@@ -11830,6 +12205,36 @@
           </a:prstGeom>
         </p:spPr>
       </p:pic>
+      <p:pic>
+        <p:nvPicPr>
+          <p:cNvPr id="107" name="Picture 106">
+            <a:extLst>
+              <a:ext uri="{FF2B5EF4-FFF2-40B4-BE49-F238E27FC236}">
+                <a16:creationId xmlns:a16="http://schemas.microsoft.com/office/drawing/2014/main" id="{B9554B4E-82F3-1A4B-F18B-DB1CEFC411CA}"/>
+              </a:ext>
+            </a:extLst>
+          </p:cNvPr>
+          <p:cNvPicPr>
+            <a:picLocks noChangeAspect="1"/>
+          </p:cNvPicPr>
+          <p:nvPr/>
+        </p:nvPicPr>
+        <p:blipFill>
+          <a:blip r:embed="rId4"/>
+          <a:stretch>
+            <a:fillRect/>
+          </a:stretch>
+        </p:blipFill>
+        <p:spPr>
+          <a:xfrm rot="19867121">
+            <a:off x="7219161" y="823325"/>
+            <a:ext cx="2957487" cy="2957487"/>
+          </a:xfrm>
+          <a:prstGeom prst="rect">
+            <a:avLst/>
+          </a:prstGeom>
+        </p:spPr>
+      </p:pic>
       <p:cxnSp>
         <p:nvCxnSpPr>
           <p:cNvPr id="8" name="Straight Arrow Connector 7">
@@ -16319,36 +16724,6 @@
           </a:p>
         </p:txBody>
       </p:sp>
-      <p:pic>
-        <p:nvPicPr>
-          <p:cNvPr id="12" name="Picture 11">
-            <a:extLst>
-              <a:ext uri="{FF2B5EF4-FFF2-40B4-BE49-F238E27FC236}">
-                <a16:creationId xmlns:a16="http://schemas.microsoft.com/office/drawing/2014/main" id="{78717855-F967-D4D3-6C6B-21F53D9BE4F3}"/>
-              </a:ext>
-            </a:extLst>
-          </p:cNvPr>
-          <p:cNvPicPr>
-            <a:picLocks noChangeAspect="1"/>
-          </p:cNvPicPr>
-          <p:nvPr/>
-        </p:nvPicPr>
-        <p:blipFill>
-          <a:blip r:embed="rId4"/>
-          <a:stretch>
-            <a:fillRect/>
-          </a:stretch>
-        </p:blipFill>
-        <p:spPr>
-          <a:xfrm rot="19935339">
-            <a:off x="7206979" y="815399"/>
-            <a:ext cx="2969168" cy="2971907"/>
-          </a:xfrm>
-          <a:prstGeom prst="rect">
-            <a:avLst/>
-          </a:prstGeom>
-        </p:spPr>
-      </p:pic>
       <p:grpSp>
         <p:nvGrpSpPr>
           <p:cNvPr id="16" name="Group 15">
@@ -16661,7 +17036,7 @@
         <p:spPr>
           <a:xfrm>
             <a:off x="10695212" y="1275944"/>
-            <a:ext cx="1536132" cy="2893100"/>
+            <a:ext cx="1536132" cy="2677656"/>
           </a:xfrm>
           <a:prstGeom prst="rect">
             <a:avLst/>
@@ -16738,7 +17113,7 @@
                   </a:outerShdw>
                 </a:effectLst>
               </a:rPr>
-              <a:t>NIRS Toolbox</a:t>
+              <a:t>NIRS-SPM	</a:t>
             </a:r>
           </a:p>
           <a:p>
@@ -16750,7 +17125,7 @@
                   </a:outerShdw>
                 </a:effectLst>
               </a:rPr>
-              <a:t>NIRS-SPM	</a:t>
+              <a:t>AtlasViewer	</a:t>
             </a:r>
           </a:p>
           <a:p>
@@ -16762,7 +17137,7 @@
                   </a:outerShdw>
                 </a:effectLst>
               </a:rPr>
-              <a:t>AtlasViewer	</a:t>
+              <a:t>Satori	</a:t>
             </a:r>
           </a:p>
           <a:p>
@@ -16774,19 +17149,7 @@
                   </a:outerShdw>
                 </a:effectLst>
               </a:rPr>
-              <a:t>Satori	</a:t>
-            </a:r>
-          </a:p>
-          <a:p>
-            <a:r>
-              <a:rPr lang="en-US" sz="1400" dirty="0">
-                <a:effectLst>
-                  <a:outerShdw blurRad="88900" sx="106000" sy="106000" algn="ctr" rotWithShape="0">
-                    <a:schemeClr val="bg1"/>
-                  </a:outerShdw>
-                </a:effectLst>
-              </a:rPr>
-              <a:t>RStudio</a:t>
+              <a:t>R</a:t>
             </a:r>
           </a:p>
           <a:p>
@@ -17327,10 +17690,10 @@
       </p:sp>
       <p:sp>
         <p:nvSpPr>
-          <p:cNvPr id="155" name="TextBox 154">
-            <a:extLst>
-              <a:ext uri="{FF2B5EF4-FFF2-40B4-BE49-F238E27FC236}">
-                <a16:creationId xmlns:a16="http://schemas.microsoft.com/office/drawing/2014/main" id="{63C8BD21-C31E-CDA5-44CE-E0289367F2B0}"/>
+          <p:cNvPr id="160" name="TextBox 159">
+            <a:extLst>
+              <a:ext uri="{FF2B5EF4-FFF2-40B4-BE49-F238E27FC236}">
+                <a16:creationId xmlns:a16="http://schemas.microsoft.com/office/drawing/2014/main" id="{B72F0A8D-E395-7104-0051-3366422F1A86}"/>
               </a:ext>
             </a:extLst>
           </p:cNvPr>
@@ -17339,8 +17702,8 @@
         </p:nvSpPr>
         <p:spPr>
           <a:xfrm>
-            <a:off x="8461339" y="1209992"/>
-            <a:ext cx="1010087" cy="523220"/>
+            <a:off x="8456908" y="2988402"/>
+            <a:ext cx="567784" cy="738664"/>
           </a:xfrm>
           <a:prstGeom prst="rect">
             <a:avLst/>
@@ -17356,55 +17719,6 @@
           </a:effectLst>
         </p:spPr>
         <p:txBody>
-          <a:bodyPr wrap="square" rtlCol="0">
-            <a:spAutoFit/>
-          </a:bodyPr>
-          <a:lstStyle/>
-          <a:p>
-            <a:r>
-              <a:rPr lang="en-US" sz="1400" dirty="0">
-                <a:effectLst>
-                  <a:outerShdw blurRad="88900" sx="106000" sy="106000" algn="ctr" rotWithShape="0">
-                    <a:schemeClr val="bg1"/>
-                  </a:outerShdw>
-                </a:effectLst>
-              </a:rPr>
-              <a:t>Homer3 53</a:t>
-            </a:r>
-          </a:p>
-        </p:txBody>
-      </p:sp>
-      <p:sp>
-        <p:nvSpPr>
-          <p:cNvPr id="160" name="TextBox 159">
-            <a:extLst>
-              <a:ext uri="{FF2B5EF4-FFF2-40B4-BE49-F238E27FC236}">
-                <a16:creationId xmlns:a16="http://schemas.microsoft.com/office/drawing/2014/main" id="{B72F0A8D-E395-7104-0051-3366422F1A86}"/>
-              </a:ext>
-            </a:extLst>
-          </p:cNvPr>
-          <p:cNvSpPr txBox="1"/>
-          <p:nvPr/>
-        </p:nvSpPr>
-        <p:spPr>
-          <a:xfrm>
-            <a:off x="8289750" y="3043219"/>
-            <a:ext cx="567784" cy="738664"/>
-          </a:xfrm>
-          <a:prstGeom prst="rect">
-            <a:avLst/>
-          </a:prstGeom>
-          <a:noFill/>
-          <a:effectLst>
-            <a:glow rad="63500">
-              <a:schemeClr val="accent1">
-                <a:satMod val="175000"/>
-                <a:alpha val="40000"/>
-              </a:schemeClr>
-            </a:glow>
-          </a:effectLst>
-        </p:spPr>
-        <p:txBody>
           <a:bodyPr wrap="none" rtlCol="0">
             <a:spAutoFit/>
           </a:bodyPr>
@@ -17491,7 +17805,7 @@
         </p:nvSpPr>
         <p:spPr>
           <a:xfrm>
-            <a:off x="8780620" y="3198067"/>
+            <a:off x="8932992" y="3093656"/>
             <a:ext cx="627095" cy="523220"/>
           </a:xfrm>
           <a:prstGeom prst="rect">
@@ -17796,12 +18110,12 @@
         </p:nvCxnSpPr>
         <p:spPr>
           <a:xfrm>
-            <a:off x="10159828" y="2336328"/>
-            <a:ext cx="590300" cy="354265"/>
+            <a:off x="10140052" y="2425669"/>
+            <a:ext cx="610076" cy="264924"/>
           </a:xfrm>
           <a:prstGeom prst="bentConnector3">
             <a:avLst>
-              <a:gd name="adj1" fmla="val 17729"/>
+              <a:gd name="adj1" fmla="val 22521"/>
             </a:avLst>
           </a:prstGeom>
           <a:ln>
@@ -17841,12 +18155,12 @@
         </p:nvCxnSpPr>
         <p:spPr>
           <a:xfrm>
-            <a:off x="10129425" y="2634004"/>
-            <a:ext cx="631944" cy="280860"/>
+            <a:off x="10125075" y="2686050"/>
+            <a:ext cx="636293" cy="228813"/>
           </a:xfrm>
           <a:prstGeom prst="bentConnector3">
             <a:avLst>
-              <a:gd name="adj1" fmla="val 10812"/>
+              <a:gd name="adj1" fmla="val 11454"/>
             </a:avLst>
           </a:prstGeom>
           <a:ln>
@@ -17870,96 +18184,6 @@
           </a:fontRef>
         </p:style>
       </p:cxnSp>
-      <p:cxnSp>
-        <p:nvCxnSpPr>
-          <p:cNvPr id="209" name="Connector: Elbow 208">
-            <a:extLst>
-              <a:ext uri="{FF2B5EF4-FFF2-40B4-BE49-F238E27FC236}">
-                <a16:creationId xmlns:a16="http://schemas.microsoft.com/office/drawing/2014/main" id="{F6AFF022-C199-AE9C-6E8D-763554201520}"/>
-              </a:ext>
-            </a:extLst>
-          </p:cNvPr>
-          <p:cNvCxnSpPr>
-            <a:cxnSpLocks/>
-          </p:cNvCxnSpPr>
-          <p:nvPr/>
-        </p:nvCxnSpPr>
-        <p:spPr>
-          <a:xfrm>
-            <a:off x="9880605" y="3184306"/>
-            <a:ext cx="880764" cy="153990"/>
-          </a:xfrm>
-          <a:prstGeom prst="bentConnector3">
-            <a:avLst>
-              <a:gd name="adj1" fmla="val 8184"/>
-            </a:avLst>
-          </a:prstGeom>
-          <a:ln>
-            <a:solidFill>
-              <a:srgbClr val="042433"/>
-            </a:solidFill>
-          </a:ln>
-        </p:spPr>
-        <p:style>
-          <a:lnRef idx="2">
-            <a:schemeClr val="accent1"/>
-          </a:lnRef>
-          <a:fillRef idx="0">
-            <a:schemeClr val="accent1"/>
-          </a:fillRef>
-          <a:effectRef idx="1">
-            <a:schemeClr val="accent1"/>
-          </a:effectRef>
-          <a:fontRef idx="minor">
-            <a:schemeClr val="tx1"/>
-          </a:fontRef>
-        </p:style>
-      </p:cxnSp>
-      <p:cxnSp>
-        <p:nvCxnSpPr>
-          <p:cNvPr id="211" name="Connector: Elbow 210">
-            <a:extLst>
-              <a:ext uri="{FF2B5EF4-FFF2-40B4-BE49-F238E27FC236}">
-                <a16:creationId xmlns:a16="http://schemas.microsoft.com/office/drawing/2014/main" id="{4734A628-5356-3809-8B66-728534C71ED2}"/>
-              </a:ext>
-            </a:extLst>
-          </p:cNvPr>
-          <p:cNvCxnSpPr>
-            <a:cxnSpLocks/>
-          </p:cNvCxnSpPr>
-          <p:nvPr/>
-        </p:nvCxnSpPr>
-        <p:spPr>
-          <a:xfrm>
-            <a:off x="9571769" y="3495646"/>
-            <a:ext cx="1189600" cy="64996"/>
-          </a:xfrm>
-          <a:prstGeom prst="bentConnector3">
-            <a:avLst>
-              <a:gd name="adj1" fmla="val 12101"/>
-            </a:avLst>
-          </a:prstGeom>
-          <a:ln>
-            <a:solidFill>
-              <a:srgbClr val="042433"/>
-            </a:solidFill>
-          </a:ln>
-        </p:spPr>
-        <p:style>
-          <a:lnRef idx="2">
-            <a:schemeClr val="accent1"/>
-          </a:lnRef>
-          <a:fillRef idx="0">
-            <a:schemeClr val="accent1"/>
-          </a:fillRef>
-          <a:effectRef idx="1">
-            <a:schemeClr val="accent1"/>
-          </a:effectRef>
-          <a:fontRef idx="minor">
-            <a:schemeClr val="tx1"/>
-          </a:fontRef>
-        </p:style>
-      </p:cxnSp>
       <p:sp>
         <p:nvSpPr>
           <p:cNvPr id="223" name="TextBox 222">
@@ -18018,12 +18242,12 @@
         </p:nvCxnSpPr>
         <p:spPr>
           <a:xfrm>
-            <a:off x="10044064" y="2904911"/>
-            <a:ext cx="729519" cy="221050"/>
+            <a:off x="9990137" y="2994608"/>
+            <a:ext cx="783446" cy="131353"/>
           </a:xfrm>
           <a:prstGeom prst="bentConnector3">
             <a:avLst>
-              <a:gd name="adj1" fmla="val 9960"/>
+              <a:gd name="adj1" fmla="val 18390"/>
             </a:avLst>
           </a:prstGeom>
           <a:ln>
@@ -21368,10 +21592,10 @@
       </p:grpSp>
       <p:sp>
         <p:nvSpPr>
-          <p:cNvPr id="5" name="TextBox 4">
-            <a:extLst>
-              <a:ext uri="{FF2B5EF4-FFF2-40B4-BE49-F238E27FC236}">
-                <a16:creationId xmlns:a16="http://schemas.microsoft.com/office/drawing/2014/main" id="{38E6293C-E133-AC81-8CC3-D05681C72B57}"/>
+          <p:cNvPr id="6" name="TextBox 5">
+            <a:extLst>
+              <a:ext uri="{FF2B5EF4-FFF2-40B4-BE49-F238E27FC236}">
+                <a16:creationId xmlns:a16="http://schemas.microsoft.com/office/drawing/2014/main" id="{6A249053-41E9-504E-A52A-61A1995E9131}"/>
               </a:ext>
             </a:extLst>
           </p:cNvPr>
@@ -21380,8 +21604,8 @@
         </p:nvSpPr>
         <p:spPr>
           <a:xfrm>
-            <a:off x="7276462" y="2288649"/>
-            <a:ext cx="848309" cy="523220"/>
+            <a:off x="7838757" y="3071516"/>
+            <a:ext cx="551753" cy="523220"/>
           </a:xfrm>
           <a:prstGeom prst="rect">
             <a:avLst/>
@@ -21414,12 +21638,9 @@
                   </a:outerShdw>
                 </a:effectLst>
               </a:rPr>
-              <a:t>AnalyzIR</a:t>
-            </a:r>
-          </a:p>
-          <a:p>
-            <a:pPr algn="ctr"/>
-            <a:r>
+              <a:t>MNE</a:t>
+            </a:r>
+            <a:br>
               <a:rPr lang="en-US" sz="1400" dirty="0">
                 <a:solidFill>
                   <a:schemeClr val="bg1"/>
@@ -21430,17 +21651,29 @@
                   </a:outerShdw>
                 </a:effectLst>
               </a:rPr>
-              <a:t>26</a:t>
-            </a:r>
-          </a:p>
-        </p:txBody>
-      </p:sp>
-      <p:sp>
-        <p:nvSpPr>
-          <p:cNvPr id="6" name="TextBox 5">
-            <a:extLst>
-              <a:ext uri="{FF2B5EF4-FFF2-40B4-BE49-F238E27FC236}">
-                <a16:creationId xmlns:a16="http://schemas.microsoft.com/office/drawing/2014/main" id="{6A249053-41E9-504E-A52A-61A1995E9131}"/>
+            </a:br>
+            <a:r>
+              <a:rPr lang="en-US" sz="1400" dirty="0">
+                <a:solidFill>
+                  <a:schemeClr val="bg1"/>
+                </a:solidFill>
+                <a:effectLst>
+                  <a:outerShdw blurRad="88900" sx="106000" sy="106000" algn="ctr" rotWithShape="0">
+                    <a:schemeClr val="tx1"/>
+                  </a:outerShdw>
+                </a:effectLst>
+              </a:rPr>
+              <a:t>19</a:t>
+            </a:r>
+          </a:p>
+        </p:txBody>
+      </p:sp>
+      <p:sp>
+        <p:nvSpPr>
+          <p:cNvPr id="18" name="TextBox 17">
+            <a:extLst>
+              <a:ext uri="{FF2B5EF4-FFF2-40B4-BE49-F238E27FC236}">
+                <a16:creationId xmlns:a16="http://schemas.microsoft.com/office/drawing/2014/main" id="{6CC1405D-EBAF-0B71-6D1C-D976EC4C6E27}"/>
               </a:ext>
             </a:extLst>
           </p:cNvPr>
@@ -21449,8 +21682,8 @@
         </p:nvSpPr>
         <p:spPr>
           <a:xfrm>
-            <a:off x="7713984" y="2950623"/>
-            <a:ext cx="551753" cy="523220"/>
+            <a:off x="9476228" y="3033421"/>
+            <a:ext cx="280846" cy="307777"/>
           </a:xfrm>
           <a:prstGeom prst="rect">
             <a:avLst/>
@@ -21483,42 +21716,17 @@
                   </a:outerShdw>
                 </a:effectLst>
               </a:rPr>
-              <a:t>MNE</a:t>
-            </a:r>
-            <a:br>
-              <a:rPr lang="en-US" sz="1400" dirty="0">
-                <a:solidFill>
-                  <a:schemeClr val="bg1"/>
-                </a:solidFill>
-                <a:effectLst>
-                  <a:outerShdw blurRad="88900" sx="106000" sy="106000" algn="ctr" rotWithShape="0">
-                    <a:schemeClr val="tx1"/>
-                  </a:outerShdw>
-                </a:effectLst>
-              </a:rPr>
-            </a:br>
-            <a:r>
-              <a:rPr lang="en-US" sz="1400" dirty="0">
-                <a:solidFill>
-                  <a:schemeClr val="bg1"/>
-                </a:solidFill>
-                <a:effectLst>
-                  <a:outerShdw blurRad="88900" sx="106000" sy="106000" algn="ctr" rotWithShape="0">
-                    <a:schemeClr val="tx1"/>
-                  </a:outerShdw>
-                </a:effectLst>
-              </a:rPr>
-              <a:t>19</a:t>
-            </a:r>
-          </a:p>
-        </p:txBody>
-      </p:sp>
-      <p:sp>
-        <p:nvSpPr>
-          <p:cNvPr id="18" name="TextBox 17">
-            <a:extLst>
-              <a:ext uri="{FF2B5EF4-FFF2-40B4-BE49-F238E27FC236}">
-                <a16:creationId xmlns:a16="http://schemas.microsoft.com/office/drawing/2014/main" id="{6CC1405D-EBAF-0B71-6D1C-D976EC4C6E27}"/>
+              <a:t>9</a:t>
+            </a:r>
+          </a:p>
+        </p:txBody>
+      </p:sp>
+      <p:sp>
+        <p:nvSpPr>
+          <p:cNvPr id="19" name="TextBox 18">
+            <a:extLst>
+              <a:ext uri="{FF2B5EF4-FFF2-40B4-BE49-F238E27FC236}">
+                <a16:creationId xmlns:a16="http://schemas.microsoft.com/office/drawing/2014/main" id="{11B5C7E3-F36C-5DCF-F9AF-814F1445341E}"/>
               </a:ext>
             </a:extLst>
           </p:cNvPr>
@@ -21527,7 +21735,7 @@
         </p:nvSpPr>
         <p:spPr>
           <a:xfrm>
-            <a:off x="9329394" y="3192635"/>
+            <a:off x="9681942" y="2750830"/>
             <a:ext cx="280846" cy="307777"/>
           </a:xfrm>
           <a:prstGeom prst="rect">
@@ -21568,10 +21776,10 @@
       </p:sp>
       <p:sp>
         <p:nvSpPr>
-          <p:cNvPr id="19" name="TextBox 18">
-            <a:extLst>
-              <a:ext uri="{FF2B5EF4-FFF2-40B4-BE49-F238E27FC236}">
-                <a16:creationId xmlns:a16="http://schemas.microsoft.com/office/drawing/2014/main" id="{11B5C7E3-F36C-5DCF-F9AF-814F1445341E}"/>
+          <p:cNvPr id="40" name="TextBox 39">
+            <a:extLst>
+              <a:ext uri="{FF2B5EF4-FFF2-40B4-BE49-F238E27FC236}">
+                <a16:creationId xmlns:a16="http://schemas.microsoft.com/office/drawing/2014/main" id="{7F315EE5-E02B-C2FD-0DC0-309A1F8DF248}"/>
               </a:ext>
             </a:extLst>
           </p:cNvPr>
@@ -21580,7 +21788,7 @@
         </p:nvSpPr>
         <p:spPr>
           <a:xfrm>
-            <a:off x="9579380" y="2925576"/>
+            <a:off x="9791585" y="2464720"/>
             <a:ext cx="280846" cy="307777"/>
           </a:xfrm>
           <a:prstGeom prst="rect">
@@ -21614,17 +21822,17 @@
                   </a:outerShdw>
                 </a:effectLst>
               </a:rPr>
-              <a:t>9</a:t>
-            </a:r>
-          </a:p>
-        </p:txBody>
-      </p:sp>
-      <p:sp>
-        <p:nvSpPr>
-          <p:cNvPr id="39" name="TextBox 38">
-            <a:extLst>
-              <a:ext uri="{FF2B5EF4-FFF2-40B4-BE49-F238E27FC236}">
-                <a16:creationId xmlns:a16="http://schemas.microsoft.com/office/drawing/2014/main" id="{A32BFE31-E579-1D8A-1A0A-0F4142D45147}"/>
+              <a:t>6</a:t>
+            </a:r>
+          </a:p>
+        </p:txBody>
+      </p:sp>
+      <p:sp>
+        <p:nvSpPr>
+          <p:cNvPr id="41" name="TextBox 40">
+            <a:extLst>
+              <a:ext uri="{FF2B5EF4-FFF2-40B4-BE49-F238E27FC236}">
+                <a16:creationId xmlns:a16="http://schemas.microsoft.com/office/drawing/2014/main" id="{BD773782-CE67-8CE3-99F3-4B813D46D9D3}"/>
               </a:ext>
             </a:extLst>
           </p:cNvPr>
@@ -21633,8 +21841,8 @@
         </p:nvSpPr>
         <p:spPr>
           <a:xfrm>
-            <a:off x="9746735" y="2681026"/>
-            <a:ext cx="280846" cy="307777"/>
+            <a:off x="9835476" y="2234062"/>
+            <a:ext cx="280847" cy="307777"/>
           </a:xfrm>
           <a:prstGeom prst="rect">
             <a:avLst/>
@@ -21674,10 +21882,10 @@
       </p:sp>
       <p:sp>
         <p:nvSpPr>
-          <p:cNvPr id="40" name="TextBox 39">
-            <a:extLst>
-              <a:ext uri="{FF2B5EF4-FFF2-40B4-BE49-F238E27FC236}">
-                <a16:creationId xmlns:a16="http://schemas.microsoft.com/office/drawing/2014/main" id="{7F315EE5-E02B-C2FD-0DC0-309A1F8DF248}"/>
+          <p:cNvPr id="56" name="TextBox 55">
+            <a:extLst>
+              <a:ext uri="{FF2B5EF4-FFF2-40B4-BE49-F238E27FC236}">
+                <a16:creationId xmlns:a16="http://schemas.microsoft.com/office/drawing/2014/main" id="{2871F6EE-7F5A-6148-5CF7-B8C524960739}"/>
               </a:ext>
             </a:extLst>
           </p:cNvPr>
@@ -21686,7 +21894,7 @@
         </p:nvSpPr>
         <p:spPr>
           <a:xfrm>
-            <a:off x="9860017" y="2460648"/>
+            <a:off x="9835476" y="1992518"/>
             <a:ext cx="280846" cy="307777"/>
           </a:xfrm>
           <a:prstGeom prst="rect">
@@ -21720,17 +21928,17 @@
                   </a:outerShdw>
                 </a:effectLst>
               </a:rPr>
-              <a:t>6</a:t>
-            </a:r>
-          </a:p>
-        </p:txBody>
-      </p:sp>
-      <p:sp>
-        <p:nvSpPr>
-          <p:cNvPr id="41" name="TextBox 40">
-            <a:extLst>
-              <a:ext uri="{FF2B5EF4-FFF2-40B4-BE49-F238E27FC236}">
-                <a16:creationId xmlns:a16="http://schemas.microsoft.com/office/drawing/2014/main" id="{BD773782-CE67-8CE3-99F3-4B813D46D9D3}"/>
+              <a:t>4</a:t>
+            </a:r>
+          </a:p>
+        </p:txBody>
+      </p:sp>
+      <p:sp>
+        <p:nvSpPr>
+          <p:cNvPr id="57" name="TextBox 56">
+            <a:extLst>
+              <a:ext uri="{FF2B5EF4-FFF2-40B4-BE49-F238E27FC236}">
+                <a16:creationId xmlns:a16="http://schemas.microsoft.com/office/drawing/2014/main" id="{A4A94965-27FF-DF2D-08A5-914B09A185DC}"/>
               </a:ext>
             </a:extLst>
           </p:cNvPr>
@@ -21739,7 +21947,7 @@
         </p:nvSpPr>
         <p:spPr>
           <a:xfrm>
-            <a:off x="9860017" y="2201934"/>
+            <a:off x="9806602" y="1794983"/>
             <a:ext cx="280846" cy="307777"/>
           </a:xfrm>
           <a:prstGeom prst="rect">
@@ -21780,10 +21988,10 @@
       </p:sp>
       <p:sp>
         <p:nvSpPr>
-          <p:cNvPr id="56" name="TextBox 55">
-            <a:extLst>
-              <a:ext uri="{FF2B5EF4-FFF2-40B4-BE49-F238E27FC236}">
-                <a16:creationId xmlns:a16="http://schemas.microsoft.com/office/drawing/2014/main" id="{2871F6EE-7F5A-6148-5CF7-B8C524960739}"/>
+          <p:cNvPr id="65" name="TextBox 64">
+            <a:extLst>
+              <a:ext uri="{FF2B5EF4-FFF2-40B4-BE49-F238E27FC236}">
+                <a16:creationId xmlns:a16="http://schemas.microsoft.com/office/drawing/2014/main" id="{EE893595-5901-F433-1625-C9830E083E48}"/>
               </a:ext>
             </a:extLst>
           </p:cNvPr>
@@ -21792,7 +22000,7 @@
         </p:nvSpPr>
         <p:spPr>
           <a:xfrm>
-            <a:off x="9859206" y="1988044"/>
+            <a:off x="9763488" y="1648321"/>
             <a:ext cx="280846" cy="307777"/>
           </a:xfrm>
           <a:prstGeom prst="rect">
@@ -21826,17 +22034,17 @@
                   </a:outerShdw>
                 </a:effectLst>
               </a:rPr>
-              <a:t>4</a:t>
-            </a:r>
-          </a:p>
-        </p:txBody>
-      </p:sp>
-      <p:sp>
-        <p:nvSpPr>
-          <p:cNvPr id="57" name="TextBox 56">
-            <a:extLst>
-              <a:ext uri="{FF2B5EF4-FFF2-40B4-BE49-F238E27FC236}">
-                <a16:creationId xmlns:a16="http://schemas.microsoft.com/office/drawing/2014/main" id="{A4A94965-27FF-DF2D-08A5-914B09A185DC}"/>
+              <a:t>3</a:t>
+            </a:r>
+          </a:p>
+        </p:txBody>
+      </p:sp>
+      <p:sp>
+        <p:nvSpPr>
+          <p:cNvPr id="69" name="TextBox 68">
+            <a:extLst>
+              <a:ext uri="{FF2B5EF4-FFF2-40B4-BE49-F238E27FC236}">
+                <a16:creationId xmlns:a16="http://schemas.microsoft.com/office/drawing/2014/main" id="{17ADBA87-D364-2288-C1EE-B5CF0E836332}"/>
               </a:ext>
             </a:extLst>
           </p:cNvPr>
@@ -21845,7 +22053,7 @@
         </p:nvSpPr>
         <p:spPr>
           <a:xfrm>
-            <a:off x="9830664" y="1790741"/>
+            <a:off x="9695053" y="1513145"/>
             <a:ext cx="280846" cy="307777"/>
           </a:xfrm>
           <a:prstGeom prst="rect">
@@ -21879,17 +22087,17 @@
                   </a:outerShdw>
                 </a:effectLst>
               </a:rPr>
-              <a:t>4</a:t>
-            </a:r>
-          </a:p>
-        </p:txBody>
-      </p:sp>
-      <p:sp>
-        <p:nvSpPr>
-          <p:cNvPr id="65" name="TextBox 64">
-            <a:extLst>
-              <a:ext uri="{FF2B5EF4-FFF2-40B4-BE49-F238E27FC236}">
-                <a16:creationId xmlns:a16="http://schemas.microsoft.com/office/drawing/2014/main" id="{EE893595-5901-F433-1625-C9830E083E48}"/>
+              <a:t>3</a:t>
+            </a:r>
+          </a:p>
+        </p:txBody>
+      </p:sp>
+      <p:sp>
+        <p:nvSpPr>
+          <p:cNvPr id="70" name="TextBox 69">
+            <a:extLst>
+              <a:ext uri="{FF2B5EF4-FFF2-40B4-BE49-F238E27FC236}">
+                <a16:creationId xmlns:a16="http://schemas.microsoft.com/office/drawing/2014/main" id="{B3E99D51-CEDB-94C7-466F-78F1FBB3BF47}"/>
               </a:ext>
             </a:extLst>
           </p:cNvPr>
@@ -21898,7 +22106,7 @@
         </p:nvSpPr>
         <p:spPr>
           <a:xfrm>
-            <a:off x="9808946" y="1638463"/>
+            <a:off x="9629420" y="1395079"/>
             <a:ext cx="280846" cy="307777"/>
           </a:xfrm>
           <a:prstGeom prst="rect">
@@ -21939,10 +22147,10 @@
       </p:sp>
       <p:sp>
         <p:nvSpPr>
-          <p:cNvPr id="69" name="TextBox 68">
-            <a:extLst>
-              <a:ext uri="{FF2B5EF4-FFF2-40B4-BE49-F238E27FC236}">
-                <a16:creationId xmlns:a16="http://schemas.microsoft.com/office/drawing/2014/main" id="{17ADBA87-D364-2288-C1EE-B5CF0E836332}"/>
+          <p:cNvPr id="95" name="TextBox 94">
+            <a:extLst>
+              <a:ext uri="{FF2B5EF4-FFF2-40B4-BE49-F238E27FC236}">
+                <a16:creationId xmlns:a16="http://schemas.microsoft.com/office/drawing/2014/main" id="{C0B3BEE4-CC57-F680-1A76-6EFC93007278}"/>
               </a:ext>
             </a:extLst>
           </p:cNvPr>
@@ -21951,8 +22159,8 @@
         </p:nvSpPr>
         <p:spPr>
           <a:xfrm>
-            <a:off x="9747839" y="1510743"/>
-            <a:ext cx="280846" cy="307777"/>
+            <a:off x="9688068" y="1257642"/>
+            <a:ext cx="226005" cy="307777"/>
           </a:xfrm>
           <a:prstGeom prst="rect">
             <a:avLst/>
@@ -21968,34 +22176,30 @@
           </a:effectLst>
         </p:spPr>
         <p:txBody>
-          <a:bodyPr wrap="none" rtlCol="0">
+          <a:bodyPr wrap="square" rtlCol="0">
             <a:spAutoFit/>
           </a:bodyPr>
           <a:lstStyle/>
           <a:p>
-            <a:pPr algn="ctr"/>
             <a:r>
               <a:rPr lang="en-US" sz="1400" dirty="0">
-                <a:solidFill>
-                  <a:schemeClr val="bg1"/>
-                </a:solidFill>
-                <a:effectLst>
-                  <a:outerShdw blurRad="88900" sx="106000" sy="106000" algn="ctr" rotWithShape="0">
-                    <a:schemeClr val="tx1"/>
-                  </a:outerShdw>
-                </a:effectLst>
-              </a:rPr>
-              <a:t>3</a:t>
-            </a:r>
-          </a:p>
-        </p:txBody>
-      </p:sp>
-      <p:sp>
-        <p:nvSpPr>
-          <p:cNvPr id="70" name="TextBox 69">
-            <a:extLst>
-              <a:ext uri="{FF2B5EF4-FFF2-40B4-BE49-F238E27FC236}">
-                <a16:creationId xmlns:a16="http://schemas.microsoft.com/office/drawing/2014/main" id="{B3E99D51-CEDB-94C7-466F-78F1FBB3BF47}"/>
+                <a:effectLst>
+                  <a:outerShdw blurRad="88900" sx="106000" sy="106000" algn="ctr" rotWithShape="0">
+                    <a:schemeClr val="bg1"/>
+                  </a:outerShdw>
+                </a:effectLst>
+              </a:rPr>
+              <a:t>1</a:t>
+            </a:r>
+          </a:p>
+        </p:txBody>
+      </p:sp>
+      <p:sp>
+        <p:nvSpPr>
+          <p:cNvPr id="4" name="TextBox 3">
+            <a:extLst>
+              <a:ext uri="{FF2B5EF4-FFF2-40B4-BE49-F238E27FC236}">
+                <a16:creationId xmlns:a16="http://schemas.microsoft.com/office/drawing/2014/main" id="{2D742ECB-BC87-687C-C1B0-F65376E30F29}"/>
               </a:ext>
             </a:extLst>
           </p:cNvPr>
@@ -22003,9 +22207,9 @@
           <p:nvPr/>
         </p:nvSpPr>
         <p:spPr>
-          <a:xfrm>
-            <a:off x="9655327" y="1412101"/>
-            <a:ext cx="280846" cy="307777"/>
+          <a:xfrm rot="16200000">
+            <a:off x="633107" y="5051320"/>
+            <a:ext cx="377026" cy="307777"/>
           </a:xfrm>
           <a:prstGeom prst="rect">
             <a:avLst/>
@@ -22026,29 +22230,25 @@
           </a:bodyPr>
           <a:lstStyle/>
           <a:p>
-            <a:pPr algn="ctr"/>
-            <a:r>
-              <a:rPr lang="en-US" sz="1400" dirty="0">
-                <a:solidFill>
-                  <a:schemeClr val="bg1"/>
-                </a:solidFill>
-                <a:effectLst>
-                  <a:outerShdw blurRad="88900" sx="106000" sy="106000" algn="ctr" rotWithShape="0">
-                    <a:schemeClr val="tx1"/>
-                  </a:outerShdw>
-                </a:effectLst>
-              </a:rPr>
-              <a:t>3</a:t>
-            </a:r>
-          </a:p>
-        </p:txBody>
-      </p:sp>
-      <p:sp>
-        <p:nvSpPr>
-          <p:cNvPr id="95" name="TextBox 94">
-            <a:extLst>
-              <a:ext uri="{FF2B5EF4-FFF2-40B4-BE49-F238E27FC236}">
-                <a16:creationId xmlns:a16="http://schemas.microsoft.com/office/drawing/2014/main" id="{C0B3BEE4-CC57-F680-1A76-6EFC93007278}"/>
+            <a:r>
+              <a:rPr lang="de-DE" sz="1400" dirty="0">
+                <a:effectLst>
+                  <a:outerShdw blurRad="88900" sx="106000" sy="106000" algn="ctr" rotWithShape="0">
+                    <a:schemeClr val="bg1"/>
+                  </a:outerShdw>
+                </a:effectLst>
+              </a:rPr>
+              <a:t>37</a:t>
+            </a:r>
+          </a:p>
+        </p:txBody>
+      </p:sp>
+      <p:sp>
+        <p:nvSpPr>
+          <p:cNvPr id="64" name="TextBox 63">
+            <a:extLst>
+              <a:ext uri="{FF2B5EF4-FFF2-40B4-BE49-F238E27FC236}">
+                <a16:creationId xmlns:a16="http://schemas.microsoft.com/office/drawing/2014/main" id="{8F2E0DC9-F9B1-2887-CE29-BD0C24869052}"/>
               </a:ext>
             </a:extLst>
           </p:cNvPr>
@@ -22056,9 +22256,9 @@
           <p:nvPr/>
         </p:nvSpPr>
         <p:spPr>
-          <a:xfrm>
-            <a:off x="9688068" y="1257642"/>
-            <a:ext cx="226005" cy="307777"/>
+          <a:xfrm rot="16200000">
+            <a:off x="632119" y="7125721"/>
+            <a:ext cx="377026" cy="307777"/>
           </a:xfrm>
           <a:prstGeom prst="rect">
             <a:avLst/>
@@ -22074,30 +22274,30 @@
           </a:effectLst>
         </p:spPr>
         <p:txBody>
-          <a:bodyPr wrap="square" rtlCol="0">
+          <a:bodyPr wrap="none" rtlCol="0">
             <a:spAutoFit/>
           </a:bodyPr>
           <a:lstStyle/>
           <a:p>
             <a:r>
-              <a:rPr lang="en-US" sz="1400" dirty="0">
+              <a:rPr lang="de-DE" sz="1400" dirty="0">
                 <a:effectLst>
                   <a:outerShdw blurRad="88900" sx="106000" sy="106000" algn="ctr" rotWithShape="0">
                     <a:schemeClr val="bg1"/>
                   </a:outerShdw>
                 </a:effectLst>
               </a:rPr>
-              <a:t>1</a:t>
-            </a:r>
-          </a:p>
-        </p:txBody>
-      </p:sp>
-      <p:sp>
-        <p:nvSpPr>
-          <p:cNvPr id="96" name="TextBox 95">
-            <a:extLst>
-              <a:ext uri="{FF2B5EF4-FFF2-40B4-BE49-F238E27FC236}">
-                <a16:creationId xmlns:a16="http://schemas.microsoft.com/office/drawing/2014/main" id="{9EA1F853-98C3-8221-1AA7-E0FAA020B075}"/>
+              <a:t>46</a:t>
+            </a:r>
+          </a:p>
+        </p:txBody>
+      </p:sp>
+      <p:sp>
+        <p:nvSpPr>
+          <p:cNvPr id="99" name="TextBox 98">
+            <a:extLst>
+              <a:ext uri="{FF2B5EF4-FFF2-40B4-BE49-F238E27FC236}">
+                <a16:creationId xmlns:a16="http://schemas.microsoft.com/office/drawing/2014/main" id="{AC7E108A-2AB6-D405-F605-E11D49399F2C}"/>
               </a:ext>
             </a:extLst>
           </p:cNvPr>
@@ -22105,8 +22305,177 @@
           <p:nvPr/>
         </p:nvSpPr>
         <p:spPr>
+          <a:xfrm rot="16200000">
+            <a:off x="2474691" y="7772986"/>
+            <a:ext cx="377027" cy="307777"/>
+          </a:xfrm>
+          <a:prstGeom prst="rect">
+            <a:avLst/>
+          </a:prstGeom>
+          <a:noFill/>
+        </p:spPr>
+        <p:txBody>
+          <a:bodyPr wrap="none" rtlCol="0">
+            <a:spAutoFit/>
+          </a:bodyPr>
+          <a:lstStyle/>
+          <a:p>
+            <a:pPr algn="r"/>
+            <a:r>
+              <a:rPr lang="de-DE" sz="1400" dirty="0">
+                <a:effectLst>
+                  <a:outerShdw blurRad="88900" dist="50800" dir="5400000" sx="106000" sy="106000" algn="ctr" rotWithShape="0">
+                    <a:schemeClr val="bg1"/>
+                  </a:outerShdw>
+                </a:effectLst>
+              </a:rPr>
+              <a:t>19</a:t>
+            </a:r>
+          </a:p>
+        </p:txBody>
+      </p:sp>
+      <p:sp>
+        <p:nvSpPr>
+          <p:cNvPr id="100" name="TextBox 99">
+            <a:extLst>
+              <a:ext uri="{FF2B5EF4-FFF2-40B4-BE49-F238E27FC236}">
+                <a16:creationId xmlns:a16="http://schemas.microsoft.com/office/drawing/2014/main" id="{57E6D439-F96F-473B-9FE7-BCE38513E3CC}"/>
+              </a:ext>
+            </a:extLst>
+          </p:cNvPr>
+          <p:cNvSpPr txBox="1"/>
+          <p:nvPr/>
+        </p:nvSpPr>
+        <p:spPr>
+          <a:xfrm rot="16200000">
+            <a:off x="2482264" y="5395264"/>
+            <a:ext cx="377027" cy="307777"/>
+          </a:xfrm>
+          <a:prstGeom prst="rect">
+            <a:avLst/>
+          </a:prstGeom>
+          <a:noFill/>
+        </p:spPr>
+        <p:txBody>
+          <a:bodyPr wrap="none" rtlCol="0">
+            <a:spAutoFit/>
+          </a:bodyPr>
+          <a:lstStyle/>
+          <a:p>
+            <a:pPr algn="r"/>
+            <a:r>
+              <a:rPr lang="de-DE" sz="1400" dirty="0">
+                <a:effectLst>
+                  <a:outerShdw blurRad="88900" dist="50800" dir="5400000" sx="106000" sy="106000" algn="ctr" rotWithShape="0">
+                    <a:schemeClr val="bg1"/>
+                  </a:outerShdw>
+                </a:effectLst>
+              </a:rPr>
+              <a:t>67</a:t>
+            </a:r>
+          </a:p>
+        </p:txBody>
+      </p:sp>
+      <p:sp>
+        <p:nvSpPr>
+          <p:cNvPr id="104" name="TextBox 103">
+            <a:extLst>
+              <a:ext uri="{FF2B5EF4-FFF2-40B4-BE49-F238E27FC236}">
+                <a16:creationId xmlns:a16="http://schemas.microsoft.com/office/drawing/2014/main" id="{0BFDF605-F156-8CDC-D584-8D0F396ABEBF}"/>
+              </a:ext>
+            </a:extLst>
+          </p:cNvPr>
+          <p:cNvSpPr txBox="1"/>
+          <p:nvPr/>
+        </p:nvSpPr>
+        <p:spPr>
+          <a:xfrm rot="16200000">
+            <a:off x="11649659" y="6683847"/>
+            <a:ext cx="377027" cy="307777"/>
+          </a:xfrm>
+          <a:prstGeom prst="rect">
+            <a:avLst/>
+          </a:prstGeom>
+          <a:noFill/>
+        </p:spPr>
+        <p:txBody>
+          <a:bodyPr wrap="none" rtlCol="0">
+            <a:spAutoFit/>
+          </a:bodyPr>
+          <a:lstStyle/>
+          <a:p>
+            <a:pPr algn="r"/>
+            <a:r>
+              <a:rPr lang="de-DE" sz="1400" dirty="0">
+                <a:effectLst>
+                  <a:outerShdw blurRad="88900" dist="50800" dir="5400000" sx="106000" sy="106000" algn="ctr" rotWithShape="0">
+                    <a:schemeClr val="bg1"/>
+                  </a:outerShdw>
+                </a:effectLst>
+              </a:rPr>
+              <a:t>39</a:t>
+            </a:r>
+          </a:p>
+        </p:txBody>
+      </p:sp>
+      <p:cxnSp>
+        <p:nvCxnSpPr>
+          <p:cNvPr id="114" name="Straight Connector 113">
+            <a:extLst>
+              <a:ext uri="{FF2B5EF4-FFF2-40B4-BE49-F238E27FC236}">
+                <a16:creationId xmlns:a16="http://schemas.microsoft.com/office/drawing/2014/main" id="{A9527715-D8E1-AEEA-BFED-150FD19CC545}"/>
+              </a:ext>
+            </a:extLst>
+          </p:cNvPr>
+          <p:cNvCxnSpPr>
+            <a:cxnSpLocks/>
+          </p:cNvCxnSpPr>
+          <p:nvPr/>
+        </p:nvCxnSpPr>
+        <p:spPr>
+          <a:xfrm flipV="1">
+            <a:off x="9747730" y="3319309"/>
+            <a:ext cx="954001" cy="11193"/>
+          </a:xfrm>
+          <a:prstGeom prst="line">
+            <a:avLst/>
+          </a:prstGeom>
+          <a:ln>
+            <a:solidFill>
+              <a:srgbClr val="042433"/>
+            </a:solidFill>
+          </a:ln>
+        </p:spPr>
+        <p:style>
+          <a:lnRef idx="2">
+            <a:schemeClr val="accent1"/>
+          </a:lnRef>
+          <a:fillRef idx="0">
+            <a:schemeClr val="accent1"/>
+          </a:fillRef>
+          <a:effectRef idx="1">
+            <a:schemeClr val="accent1"/>
+          </a:effectRef>
+          <a:fontRef idx="minor">
+            <a:schemeClr val="tx1"/>
+          </a:fontRef>
+        </p:style>
+      </p:cxnSp>
+      <p:sp>
+        <p:nvSpPr>
+          <p:cNvPr id="155" name="TextBox 154">
+            <a:extLst>
+              <a:ext uri="{FF2B5EF4-FFF2-40B4-BE49-F238E27FC236}">
+                <a16:creationId xmlns:a16="http://schemas.microsoft.com/office/drawing/2014/main" id="{63C8BD21-C31E-CDA5-44CE-E0289367F2B0}"/>
+              </a:ext>
+            </a:extLst>
+          </p:cNvPr>
+          <p:cNvSpPr txBox="1"/>
+          <p:nvPr/>
+        </p:nvSpPr>
+        <p:spPr>
           <a:xfrm>
-            <a:off x="7383363" y="1453510"/>
+            <a:off x="8375007" y="1038346"/>
             <a:ext cx="1010087" cy="523220"/>
           </a:xfrm>
           <a:prstGeom prst="rect">
@@ -22137,9 +22506,12 @@
                   </a:outerShdw>
                 </a:effectLst>
               </a:rPr>
-              <a:t>Matlab</a:t>
-            </a:r>
-            <a:br>
+              <a:t>Homer3</a:t>
+            </a:r>
+          </a:p>
+          <a:p>
+            <a:pPr algn="ctr"/>
+            <a:r>
               <a:rPr lang="en-US" sz="1400" dirty="0">
                 <a:effectLst>
                   <a:outerShdw blurRad="88900" sx="106000" sy="106000" algn="ctr" rotWithShape="0">
@@ -22147,26 +22519,17 @@
                   </a:outerShdw>
                 </a:effectLst>
               </a:rPr>
-            </a:br>
-            <a:r>
-              <a:rPr lang="en-US" sz="1400" dirty="0">
-                <a:effectLst>
-                  <a:outerShdw blurRad="88900" sx="106000" sy="106000" algn="ctr" rotWithShape="0">
-                    <a:schemeClr val="bg1"/>
-                  </a:outerShdw>
-                </a:effectLst>
-              </a:rPr>
-              <a:t>26</a:t>
-            </a:r>
-          </a:p>
-        </p:txBody>
-      </p:sp>
-      <p:sp>
-        <p:nvSpPr>
-          <p:cNvPr id="4" name="TextBox 3">
-            <a:extLst>
-              <a:ext uri="{FF2B5EF4-FFF2-40B4-BE49-F238E27FC236}">
-                <a16:creationId xmlns:a16="http://schemas.microsoft.com/office/drawing/2014/main" id="{2D742ECB-BC87-687C-C1B0-F65376E30F29}"/>
+              <a:t>53</a:t>
+            </a:r>
+          </a:p>
+        </p:txBody>
+      </p:sp>
+      <p:sp>
+        <p:nvSpPr>
+          <p:cNvPr id="158" name="TextBox 157">
+            <a:extLst>
+              <a:ext uri="{FF2B5EF4-FFF2-40B4-BE49-F238E27FC236}">
+                <a16:creationId xmlns:a16="http://schemas.microsoft.com/office/drawing/2014/main" id="{D6DEC4F2-CC94-8149-AB0B-88EC00108FCD}"/>
               </a:ext>
             </a:extLst>
           </p:cNvPr>
@@ -22174,9 +22537,9 @@
           <p:nvPr/>
         </p:nvSpPr>
         <p:spPr>
-          <a:xfrm rot="16200000">
-            <a:off x="633107" y="5051320"/>
-            <a:ext cx="377026" cy="307777"/>
+          <a:xfrm>
+            <a:off x="7369629" y="1443953"/>
+            <a:ext cx="1010087" cy="738664"/>
           </a:xfrm>
           <a:prstGeom prst="rect">
             <a:avLst/>
@@ -22192,30 +22555,69 @@
           </a:effectLst>
         </p:spPr>
         <p:txBody>
-          <a:bodyPr wrap="none" rtlCol="0">
+          <a:bodyPr wrap="square" rtlCol="0">
             <a:spAutoFit/>
           </a:bodyPr>
           <a:lstStyle/>
           <a:p>
-            <a:r>
-              <a:rPr lang="de-DE" sz="1400" dirty="0">
+            <a:pPr algn="ctr"/>
+            <a:r>
+              <a:rPr lang="en-US" sz="1400" dirty="0">
                 <a:effectLst>
                   <a:outerShdw blurRad="88900" sx="106000" sy="106000" algn="ctr" rotWithShape="0">
                     <a:schemeClr val="bg1"/>
                   </a:outerShdw>
                 </a:effectLst>
               </a:rPr>
-              <a:t>37</a:t>
-            </a:r>
-          </a:p>
-        </p:txBody>
-      </p:sp>
-      <p:sp>
-        <p:nvSpPr>
-          <p:cNvPr id="64" name="TextBox 63">
-            <a:extLst>
-              <a:ext uri="{FF2B5EF4-FFF2-40B4-BE49-F238E27FC236}">
-                <a16:creationId xmlns:a16="http://schemas.microsoft.com/office/drawing/2014/main" id="{8F2E0DC9-F9B1-2887-CE29-BD0C24869052}"/>
+              <a:t>NIRS Brain</a:t>
+            </a:r>
+            <a:br>
+              <a:rPr lang="en-US" sz="1400" dirty="0">
+                <a:effectLst>
+                  <a:outerShdw blurRad="88900" sx="106000" sy="106000" algn="ctr" rotWithShape="0">
+                    <a:schemeClr val="bg1"/>
+                  </a:outerShdw>
+                </a:effectLst>
+              </a:rPr>
+            </a:br>
+            <a:r>
+              <a:rPr lang="en-US" sz="1400" dirty="0">
+                <a:effectLst>
+                  <a:outerShdw blurRad="88900" sx="106000" sy="106000" algn="ctr" rotWithShape="0">
+                    <a:schemeClr val="bg1"/>
+                  </a:outerShdw>
+                </a:effectLst>
+              </a:rPr>
+              <a:t>AnalyzIR</a:t>
+            </a:r>
+            <a:br>
+              <a:rPr lang="en-US" sz="1400" dirty="0">
+                <a:effectLst>
+                  <a:outerShdw blurRad="88900" sx="106000" sy="106000" algn="ctr" rotWithShape="0">
+                    <a:schemeClr val="bg1"/>
+                  </a:outerShdw>
+                </a:effectLst>
+              </a:rPr>
+            </a:br>
+            <a:r>
+              <a:rPr lang="en-US" sz="1400" dirty="0">
+                <a:effectLst>
+                  <a:outerShdw blurRad="88900" sx="106000" sy="106000" algn="ctr" rotWithShape="0">
+                    <a:schemeClr val="bg1"/>
+                  </a:outerShdw>
+                </a:effectLst>
+              </a:rPr>
+              <a:t>30</a:t>
+            </a:r>
+          </a:p>
+        </p:txBody>
+      </p:sp>
+      <p:sp>
+        <p:nvSpPr>
+          <p:cNvPr id="169" name="TextBox 168">
+            <a:extLst>
+              <a:ext uri="{FF2B5EF4-FFF2-40B4-BE49-F238E27FC236}">
+                <a16:creationId xmlns:a16="http://schemas.microsoft.com/office/drawing/2014/main" id="{684BB657-3C07-DC5E-ADFC-4ACDF5415111}"/>
               </a:ext>
             </a:extLst>
           </p:cNvPr>
@@ -22223,9 +22625,9 @@
           <p:nvPr/>
         </p:nvSpPr>
         <p:spPr>
-          <a:xfrm rot="16200000">
-            <a:off x="632119" y="7125721"/>
-            <a:ext cx="377026" cy="307777"/>
+          <a:xfrm>
+            <a:off x="6919432" y="2284468"/>
+            <a:ext cx="1622030" cy="738664"/>
           </a:xfrm>
           <a:prstGeom prst="rect">
             <a:avLst/>
@@ -22241,147 +22643,85 @@
           </a:effectLst>
         </p:spPr>
         <p:txBody>
-          <a:bodyPr wrap="none" rtlCol="0">
+          <a:bodyPr wrap="square" rtlCol="0">
             <a:spAutoFit/>
           </a:bodyPr>
           <a:lstStyle/>
           <a:p>
+            <a:pPr algn="ctr"/>
+            <a:r>
+              <a:rPr lang="en-US" sz="1400" dirty="0">
+                <a:solidFill>
+                  <a:schemeClr val="bg1"/>
+                </a:solidFill>
+                <a:effectLst>
+                  <a:outerShdw blurRad="88900" sx="106000" sy="106000" algn="ctr" rotWithShape="0">
+                    <a:schemeClr val="tx1"/>
+                  </a:outerShdw>
+                </a:effectLst>
+              </a:rPr>
+              <a:t>Matlab </a:t>
+            </a:r>
+            <a:br>
+              <a:rPr lang="en-US" sz="1400" dirty="0">
+                <a:solidFill>
+                  <a:schemeClr val="bg1"/>
+                </a:solidFill>
+                <a:effectLst>
+                  <a:outerShdw blurRad="88900" sx="106000" sy="106000" algn="ctr" rotWithShape="0">
+                    <a:schemeClr val="tx1"/>
+                  </a:outerShdw>
+                </a:effectLst>
+              </a:rPr>
+            </a:br>
             <a:r>
               <a:rPr lang="de-DE" sz="1400" dirty="0">
-                <a:effectLst>
-                  <a:outerShdw blurRad="88900" sx="106000" sy="106000" algn="ctr" rotWithShape="0">
-                    <a:schemeClr val="bg1"/>
-                  </a:outerShdw>
-                </a:effectLst>
-              </a:rPr>
-              <a:t>46</a:t>
-            </a:r>
-          </a:p>
-        </p:txBody>
-      </p:sp>
-      <p:sp>
-        <p:nvSpPr>
-          <p:cNvPr id="99" name="TextBox 98">
-            <a:extLst>
-              <a:ext uri="{FF2B5EF4-FFF2-40B4-BE49-F238E27FC236}">
-                <a16:creationId xmlns:a16="http://schemas.microsoft.com/office/drawing/2014/main" id="{AC7E108A-2AB6-D405-F605-E11D49399F2C}"/>
-              </a:ext>
-            </a:extLst>
-          </p:cNvPr>
-          <p:cNvSpPr txBox="1"/>
-          <p:nvPr/>
-        </p:nvSpPr>
-        <p:spPr>
-          <a:xfrm rot="16200000">
-            <a:off x="2474691" y="7772986"/>
-            <a:ext cx="377027" cy="307777"/>
-          </a:xfrm>
-          <a:prstGeom prst="rect">
-            <a:avLst/>
-          </a:prstGeom>
-          <a:noFill/>
-        </p:spPr>
-        <p:txBody>
-          <a:bodyPr wrap="none" rtlCol="0">
-            <a:spAutoFit/>
-          </a:bodyPr>
-          <a:lstStyle/>
-          <a:p>
-            <a:pPr algn="r"/>
-            <a:r>
+                <a:solidFill>
+                  <a:schemeClr val="bg1"/>
+                </a:solidFill>
+                <a:effectLst>
+                  <a:outerShdw blurRad="88900" sx="106000" sy="106000" algn="ctr" rotWithShape="0">
+                    <a:schemeClr val="tx1"/>
+                  </a:outerShdw>
+                </a:effectLst>
+              </a:rPr>
+              <a:t>(custom)</a:t>
+            </a:r>
+            <a:br>
               <a:rPr lang="de-DE" sz="1400" dirty="0">
-                <a:effectLst>
-                  <a:outerShdw blurRad="88900" dist="50800" dir="5400000" sx="106000" sy="106000" algn="ctr" rotWithShape="0">
-                    <a:schemeClr val="bg1"/>
-                  </a:outerShdw>
-                </a:effectLst>
-              </a:rPr>
-              <a:t>19</a:t>
-            </a:r>
-          </a:p>
-        </p:txBody>
-      </p:sp>
-      <p:sp>
-        <p:nvSpPr>
-          <p:cNvPr id="100" name="TextBox 99">
-            <a:extLst>
-              <a:ext uri="{FF2B5EF4-FFF2-40B4-BE49-F238E27FC236}">
-                <a16:creationId xmlns:a16="http://schemas.microsoft.com/office/drawing/2014/main" id="{57E6D439-F96F-473B-9FE7-BCE38513E3CC}"/>
-              </a:ext>
-            </a:extLst>
-          </p:cNvPr>
-          <p:cNvSpPr txBox="1"/>
-          <p:nvPr/>
-        </p:nvSpPr>
-        <p:spPr>
-          <a:xfrm rot="16200000">
-            <a:off x="2482264" y="5395264"/>
-            <a:ext cx="377027" cy="307777"/>
-          </a:xfrm>
-          <a:prstGeom prst="rect">
-            <a:avLst/>
-          </a:prstGeom>
-          <a:noFill/>
-        </p:spPr>
-        <p:txBody>
-          <a:bodyPr wrap="none" rtlCol="0">
-            <a:spAutoFit/>
-          </a:bodyPr>
-          <a:lstStyle/>
-          <a:p>
-            <a:pPr algn="r"/>
+                <a:solidFill>
+                  <a:schemeClr val="bg1"/>
+                </a:solidFill>
+                <a:effectLst>
+                  <a:outerShdw blurRad="88900" sx="106000" sy="106000" algn="ctr" rotWithShape="0">
+                    <a:schemeClr val="tx1"/>
+                  </a:outerShdw>
+                </a:effectLst>
+              </a:rPr>
+            </a:br>
             <a:r>
               <a:rPr lang="de-DE" sz="1400" dirty="0">
-                <a:effectLst>
-                  <a:outerShdw blurRad="88900" dist="50800" dir="5400000" sx="106000" sy="106000" algn="ctr" rotWithShape="0">
-                    <a:schemeClr val="bg1"/>
-                  </a:outerShdw>
-                </a:effectLst>
-              </a:rPr>
-              <a:t>67</a:t>
-            </a:r>
-          </a:p>
-        </p:txBody>
-      </p:sp>
-      <p:sp>
-        <p:nvSpPr>
-          <p:cNvPr id="104" name="TextBox 103">
-            <a:extLst>
-              <a:ext uri="{FF2B5EF4-FFF2-40B4-BE49-F238E27FC236}">
-                <a16:creationId xmlns:a16="http://schemas.microsoft.com/office/drawing/2014/main" id="{0BFDF605-F156-8CDC-D584-8D0F396ABEBF}"/>
-              </a:ext>
-            </a:extLst>
-          </p:cNvPr>
-          <p:cNvSpPr txBox="1"/>
-          <p:nvPr/>
-        </p:nvSpPr>
-        <p:spPr>
-          <a:xfrm rot="16200000">
-            <a:off x="11649659" y="6683847"/>
-            <a:ext cx="377027" cy="307777"/>
-          </a:xfrm>
-          <a:prstGeom prst="rect">
-            <a:avLst/>
-          </a:prstGeom>
-          <a:noFill/>
-        </p:spPr>
-        <p:txBody>
-          <a:bodyPr wrap="none" rtlCol="0">
-            <a:spAutoFit/>
-          </a:bodyPr>
-          <a:lstStyle/>
-          <a:p>
-            <a:pPr algn="r"/>
-            <a:r>
-              <a:rPr lang="de-DE" sz="1400" dirty="0">
-                <a:effectLst>
-                  <a:outerShdw blurRad="88900" dist="50800" dir="5400000" sx="106000" sy="106000" algn="ctr" rotWithShape="0">
-                    <a:schemeClr val="bg1"/>
-                  </a:outerShdw>
-                </a:effectLst>
-              </a:rPr>
-              <a:t>39</a:t>
-            </a:r>
+                <a:solidFill>
+                  <a:schemeClr val="bg1"/>
+                </a:solidFill>
+                <a:effectLst>
+                  <a:outerShdw blurRad="88900" sx="106000" sy="106000" algn="ctr" rotWithShape="0">
+                    <a:schemeClr val="tx1"/>
+                  </a:outerShdw>
+                </a:effectLst>
+              </a:rPr>
+              <a:t>26</a:t>
+            </a:r>
+            <a:endParaRPr lang="en-US" sz="1400" b="1" dirty="0">
+              <a:solidFill>
+                <a:schemeClr val="bg1"/>
+              </a:solidFill>
+              <a:effectLst>
+                <a:outerShdw blurRad="88900" sx="106000" sy="106000" algn="ctr" rotWithShape="0">
+                  <a:schemeClr val="tx1"/>
+                </a:outerShdw>
+              </a:effectLst>
+            </a:endParaRPr>
           </a:p>
         </p:txBody>
       </p:sp>
@@ -22953,9 +23293,9 @@
         <p:grpSpPr>
           <a:xfrm>
             <a:off x="9518323" y="8269031"/>
-            <a:ext cx="1571622" cy="596213"/>
+            <a:ext cx="1571622" cy="896638"/>
             <a:chOff x="96021" y="5947719"/>
-            <a:chExt cx="1571622" cy="596213"/>
+            <a:chExt cx="1571622" cy="896638"/>
           </a:xfrm>
         </p:grpSpPr>
         <p:cxnSp>
@@ -23013,8 +23353,8 @@
           </p:nvSpPr>
           <p:spPr>
             <a:xfrm rot="600000">
-              <a:off x="96021" y="6174600"/>
-              <a:ext cx="1571622" cy="369332"/>
+              <a:off x="96021" y="6198026"/>
+              <a:ext cx="1571622" cy="646331"/>
             </a:xfrm>
             <a:prstGeom prst="rect">
               <a:avLst/>
@@ -23038,7 +23378,7 @@
                     </a:schemeClr>
                   </a:solidFill>
                 </a:rPr>
-                <a:t>p-Val</a:t>
+                <a:t>Significance Level</a:t>
               </a:r>
             </a:p>
           </p:txBody>
@@ -23592,7 +23932,7 @@
         <p:spPr>
           <a:xfrm>
             <a:off x="1589632" y="5615855"/>
-            <a:ext cx="1299266" cy="307777"/>
+            <a:ext cx="1507657" cy="307777"/>
           </a:xfrm>
           <a:prstGeom prst="rect">
             <a:avLst/>
@@ -23621,7 +23961,7 @@
                   </a:outerShdw>
                 </a:effectLst>
               </a:rPr>
-              <a:t>Mixed Effects*</a:t>
+              <a:t>Mixed Effects NN</a:t>
             </a:r>
           </a:p>
         </p:txBody>
@@ -25965,7 +26305,7 @@
         <p:spPr>
           <a:xfrm>
             <a:off x="10981744" y="2766164"/>
-            <a:ext cx="1010087" cy="523220"/>
+            <a:ext cx="1010087" cy="738664"/>
           </a:xfrm>
           <a:prstGeom prst="rect">
             <a:avLst/>
@@ -25997,6 +26337,25 @@
               </a:rPr>
               <a:t>Matlab </a:t>
             </a:r>
+            <a:br>
+              <a:rPr lang="en-US" sz="1400" dirty="0">
+                <a:effectLst>
+                  <a:outerShdw blurRad="88900" sx="106000" sy="106000" algn="ctr" rotWithShape="0">
+                    <a:schemeClr val="bg1"/>
+                  </a:outerShdw>
+                </a:effectLst>
+              </a:rPr>
+            </a:br>
+            <a:r>
+              <a:rPr lang="en-US" sz="1400" dirty="0">
+                <a:effectLst>
+                  <a:outerShdw blurRad="88900" sx="106000" sy="106000" algn="ctr" rotWithShape="0">
+                    <a:schemeClr val="bg1"/>
+                  </a:outerShdw>
+                </a:effectLst>
+              </a:rPr>
+              <a:t>(custom) </a:t>
+            </a:r>
           </a:p>
           <a:p>
             <a:pPr algn="ctr"/>
@@ -26027,7 +26386,7 @@
         </p:nvSpPr>
         <p:spPr>
           <a:xfrm>
-            <a:off x="10028899" y="1305771"/>
+            <a:off x="9981274" y="1296246"/>
             <a:ext cx="814647" cy="523220"/>
           </a:xfrm>
           <a:prstGeom prst="rect">
@@ -26105,8 +26464,8 @@
         </p:nvSpPr>
         <p:spPr>
           <a:xfrm>
-            <a:off x="10781318" y="1315289"/>
-            <a:ext cx="848309" cy="523220"/>
+            <a:off x="10542406" y="1180496"/>
+            <a:ext cx="1344774" cy="738664"/>
           </a:xfrm>
           <a:prstGeom prst="rect">
             <a:avLst/>
@@ -26122,7 +26481,7 @@
           </a:effectLst>
         </p:spPr>
         <p:txBody>
-          <a:bodyPr wrap="none" rtlCol="0">
+          <a:bodyPr wrap="square" rtlCol="0">
             <a:spAutoFit/>
           </a:bodyPr>
           <a:lstStyle/>
@@ -26139,7 +26498,7 @@
                   </a:outerShdw>
                 </a:effectLst>
               </a:rPr>
-              <a:t>AnalyzIR</a:t>
+              <a:t>NIRS Brain AnalyzIR</a:t>
             </a:r>
             <a:br>
               <a:rPr lang="en-US" sz="1400" dirty="0">
@@ -26183,8 +26542,8 @@
         </p:nvSpPr>
         <p:spPr>
           <a:xfrm>
-            <a:off x="9527361" y="1787114"/>
-            <a:ext cx="797013" cy="523220"/>
+            <a:off x="9722564" y="1705195"/>
+            <a:ext cx="377026" cy="523220"/>
           </a:xfrm>
           <a:prstGeom prst="rect">
             <a:avLst/>
@@ -26217,7 +26576,7 @@
                   </a:outerShdw>
                 </a:effectLst>
               </a:rPr>
-              <a:t>RStudio</a:t>
+              <a:t>R</a:t>
             </a:r>
             <a:br>
               <a:rPr lang="en-US" sz="1400" dirty="0">
@@ -26261,8 +26620,8 @@
         </p:nvSpPr>
         <p:spPr>
           <a:xfrm>
-            <a:off x="8073705" y="3100403"/>
-            <a:ext cx="997390" cy="954107"/>
+            <a:off x="8073705" y="2231723"/>
+            <a:ext cx="997390" cy="1815882"/>
           </a:xfrm>
           <a:prstGeom prst="rect">
             <a:avLst/>
@@ -26292,7 +26651,43 @@
                   </a:outerShdw>
                 </a:effectLst>
               </a:rPr>
-              <a:t>JASP </a:t>
+              <a:t>Python (custom)</a:t>
+            </a:r>
+          </a:p>
+          <a:p>
+            <a:pPr algn="r"/>
+            <a:endParaRPr lang="en-US" sz="1400" dirty="0">
+              <a:effectLst>
+                <a:outerShdw blurRad="88900" sx="106000" sy="106000" algn="ctr" rotWithShape="0">
+                  <a:schemeClr val="bg1"/>
+                </a:outerShdw>
+              </a:effectLst>
+            </a:endParaRPr>
+          </a:p>
+          <a:p>
+            <a:pPr algn="r"/>
+            <a:r>
+              <a:rPr lang="en-US" sz="1400" dirty="0">
+                <a:effectLst>
+                  <a:outerShdw blurRad="88900" sx="106000" sy="106000" algn="ctr" rotWithShape="0">
+                    <a:schemeClr val="bg1"/>
+                  </a:outerShdw>
+                </a:effectLst>
+              </a:rPr>
+              <a:t>JASP</a:t>
+            </a:r>
+          </a:p>
+          <a:p>
+            <a:pPr algn="r"/>
+            <a:r>
+              <a:rPr lang="en-US" sz="1400" dirty="0">
+                <a:effectLst>
+                  <a:outerShdw blurRad="88900" sx="106000" sy="106000" algn="ctr" rotWithShape="0">
+                    <a:schemeClr val="bg1"/>
+                  </a:outerShdw>
+                </a:effectLst>
+              </a:rPr>
+              <a:t> </a:t>
             </a:r>
           </a:p>
           <a:p>
@@ -26392,8 +26787,8 @@
         </p:nvSpPr>
         <p:spPr>
           <a:xfrm>
-            <a:off x="9384600" y="2287474"/>
-            <a:ext cx="763542" cy="523220"/>
+            <a:off x="9578533" y="2364524"/>
+            <a:ext cx="280846" cy="307777"/>
           </a:xfrm>
           <a:prstGeom prst="rect">
             <a:avLst/>
@@ -26426,31 +26821,6 @@
                   </a:outerShdw>
                 </a:effectLst>
               </a:rPr>
-              <a:t>Python </a:t>
-            </a:r>
-            <a:br>
-              <a:rPr lang="en-US" sz="1400" dirty="0">
-                <a:solidFill>
-                  <a:schemeClr val="bg1"/>
-                </a:solidFill>
-                <a:effectLst>
-                  <a:outerShdw blurRad="88900" sx="106000" sy="106000" algn="ctr" rotWithShape="0">
-                    <a:schemeClr val="tx1"/>
-                  </a:outerShdw>
-                </a:effectLst>
-              </a:rPr>
-            </a:br>
-            <a:r>
-              <a:rPr lang="en-US" sz="1400" dirty="0">
-                <a:solidFill>
-                  <a:schemeClr val="bg1"/>
-                </a:solidFill>
-                <a:effectLst>
-                  <a:outerShdw blurRad="88900" sx="106000" sy="106000" algn="ctr" rotWithShape="0">
-                    <a:schemeClr val="tx1"/>
-                  </a:outerShdw>
-                </a:effectLst>
-              </a:rPr>
               <a:t>9</a:t>
             </a:r>
           </a:p>
@@ -26470,8 +26840,8 @@
         </p:nvSpPr>
         <p:spPr>
           <a:xfrm rot="16200000">
-            <a:off x="266845" y="2958090"/>
-            <a:ext cx="1632178" cy="307777"/>
+            <a:off x="316538" y="2958090"/>
+            <a:ext cx="1532792" cy="307777"/>
           </a:xfrm>
           <a:prstGeom prst="rect">
             <a:avLst/>
@@ -26500,7 +26870,7 @@
                   </a:outerShdw>
                 </a:effectLst>
               </a:rPr>
-              <a:t>Multipole Methods</a:t>
+              <a:t>Multiple Methods</a:t>
             </a:r>
           </a:p>
         </p:txBody>
@@ -28873,51 +29243,6 @@
           </a:fontRef>
         </p:style>
       </p:cxnSp>
-      <p:cxnSp>
-        <p:nvCxnSpPr>
-          <p:cNvPr id="341" name="Connector: Elbow 340">
-            <a:extLst>
-              <a:ext uri="{FF2B5EF4-FFF2-40B4-BE49-F238E27FC236}">
-                <a16:creationId xmlns:a16="http://schemas.microsoft.com/office/drawing/2014/main" id="{A445EE3F-3E61-A8FE-5198-CAD4ADAC86EB}"/>
-              </a:ext>
-            </a:extLst>
-          </p:cNvPr>
-          <p:cNvCxnSpPr>
-            <a:cxnSpLocks/>
-          </p:cNvCxnSpPr>
-          <p:nvPr/>
-        </p:nvCxnSpPr>
-        <p:spPr>
-          <a:xfrm flipV="1">
-            <a:off x="9015570" y="3039670"/>
-            <a:ext cx="437691" cy="211572"/>
-          </a:xfrm>
-          <a:prstGeom prst="bentConnector3">
-            <a:avLst>
-              <a:gd name="adj1" fmla="val 86560"/>
-            </a:avLst>
-          </a:prstGeom>
-          <a:ln>
-            <a:solidFill>
-              <a:srgbClr val="042433"/>
-            </a:solidFill>
-          </a:ln>
-        </p:spPr>
-        <p:style>
-          <a:lnRef idx="2">
-            <a:schemeClr val="accent1"/>
-          </a:lnRef>
-          <a:fillRef idx="0">
-            <a:schemeClr val="accent1"/>
-          </a:fillRef>
-          <a:effectRef idx="1">
-            <a:schemeClr val="accent1"/>
-          </a:effectRef>
-          <a:fontRef idx="minor">
-            <a:schemeClr val="tx1"/>
-          </a:fontRef>
-        </p:style>
-      </p:cxnSp>
       <p:sp>
         <p:nvSpPr>
           <p:cNvPr id="349" name="Trapezoid 348">
@@ -29237,7 +29562,7 @@
                   </a:outerShdw>
                 </a:effectLst>
               </a:rPr>
-              <a:t>Mixed Effects*</a:t>
+              <a:t>Mixed Effects NN</a:t>
             </a:r>
           </a:p>
           <a:p>
@@ -30077,6 +30402,92 @@
             <a:avLst>
               <a:gd name="adj1" fmla="val 53859"/>
             </a:avLst>
+          </a:prstGeom>
+          <a:ln>
+            <a:solidFill>
+              <a:srgbClr val="042433"/>
+            </a:solidFill>
+          </a:ln>
+        </p:spPr>
+        <p:style>
+          <a:lnRef idx="2">
+            <a:schemeClr val="accent1"/>
+          </a:lnRef>
+          <a:fillRef idx="0">
+            <a:schemeClr val="accent1"/>
+          </a:fillRef>
+          <a:effectRef idx="1">
+            <a:schemeClr val="accent1"/>
+          </a:effectRef>
+          <a:fontRef idx="minor">
+            <a:schemeClr val="tx1"/>
+          </a:fontRef>
+        </p:style>
+      </p:cxnSp>
+      <p:cxnSp>
+        <p:nvCxnSpPr>
+          <p:cNvPr id="2" name="Straight Connector 1">
+            <a:extLst>
+              <a:ext uri="{FF2B5EF4-FFF2-40B4-BE49-F238E27FC236}">
+                <a16:creationId xmlns:a16="http://schemas.microsoft.com/office/drawing/2014/main" id="{F6851396-68FD-DDCE-C186-16AE5A723018}"/>
+              </a:ext>
+            </a:extLst>
+          </p:cNvPr>
+          <p:cNvCxnSpPr>
+            <a:cxnSpLocks/>
+          </p:cNvCxnSpPr>
+          <p:nvPr/>
+        </p:nvCxnSpPr>
+        <p:spPr>
+          <a:xfrm>
+            <a:off x="9042606" y="2498880"/>
+            <a:ext cx="339519" cy="0"/>
+          </a:xfrm>
+          <a:prstGeom prst="line">
+            <a:avLst/>
+          </a:prstGeom>
+          <a:ln>
+            <a:solidFill>
+              <a:srgbClr val="042433"/>
+            </a:solidFill>
+          </a:ln>
+        </p:spPr>
+        <p:style>
+          <a:lnRef idx="2">
+            <a:schemeClr val="accent1"/>
+          </a:lnRef>
+          <a:fillRef idx="0">
+            <a:schemeClr val="accent1"/>
+          </a:fillRef>
+          <a:effectRef idx="1">
+            <a:schemeClr val="accent1"/>
+          </a:effectRef>
+          <a:fontRef idx="minor">
+            <a:schemeClr val="tx1"/>
+          </a:fontRef>
+        </p:style>
+      </p:cxnSp>
+      <p:cxnSp>
+        <p:nvCxnSpPr>
+          <p:cNvPr id="6" name="Straight Connector 5">
+            <a:extLst>
+              <a:ext uri="{FF2B5EF4-FFF2-40B4-BE49-F238E27FC236}">
+                <a16:creationId xmlns:a16="http://schemas.microsoft.com/office/drawing/2014/main" id="{D51B270B-DCC2-CFA4-DD55-AD1EB8F9F083}"/>
+              </a:ext>
+            </a:extLst>
+          </p:cNvPr>
+          <p:cNvCxnSpPr>
+            <a:cxnSpLocks/>
+          </p:cNvCxnSpPr>
+          <p:nvPr/>
+        </p:nvCxnSpPr>
+        <p:spPr>
+          <a:xfrm flipV="1">
+            <a:off x="8996616" y="2999830"/>
+            <a:ext cx="435860" cy="6807"/>
+          </a:xfrm>
+          <a:prstGeom prst="line">
+            <a:avLst/>
           </a:prstGeom>
           <a:ln>
             <a:solidFill>

</xml_diff>